<commit_message>
poster - versao 1.0
</commit_message>
<xml_diff>
--- a/Documentos Base/Poster Final_Emilio_Biasi.pptx
+++ b/Documentos Base/Poster Final_Emilio_Biasi.pptx
@@ -197,7 +197,7 @@
           <a:p>
             <a:fld id="{8CBF483D-2596-4B4D-95CD-610333439B9D}" type="datetimeFigureOut">
               <a:rPr lang="pt-BR" smtClean="0"/>
-              <a:t>10/09/2022</a:t>
+              <a:t>12/09/2022</a:t>
             </a:fld>
             <a:endParaRPr lang="pt-BR"/>
           </a:p>
@@ -679,7 +679,7 @@
           <a:p>
             <a:fld id="{A7C2C1AE-BBEA-47B0-B569-45C2E2BFACC4}" type="datetimeFigureOut">
               <a:rPr lang="pt-BR" smtClean="0"/>
-              <a:t>10/09/2022</a:t>
+              <a:t>12/09/2022</a:t>
             </a:fld>
             <a:endParaRPr lang="pt-BR"/>
           </a:p>
@@ -849,7 +849,7 @@
           <a:p>
             <a:fld id="{A7C2C1AE-BBEA-47B0-B569-45C2E2BFACC4}" type="datetimeFigureOut">
               <a:rPr lang="pt-BR" smtClean="0"/>
-              <a:t>10/09/2022</a:t>
+              <a:t>12/09/2022</a:t>
             </a:fld>
             <a:endParaRPr lang="pt-BR"/>
           </a:p>
@@ -1029,7 +1029,7 @@
           <a:p>
             <a:fld id="{A7C2C1AE-BBEA-47B0-B569-45C2E2BFACC4}" type="datetimeFigureOut">
               <a:rPr lang="pt-BR" smtClean="0"/>
-              <a:t>10/09/2022</a:t>
+              <a:t>12/09/2022</a:t>
             </a:fld>
             <a:endParaRPr lang="pt-BR"/>
           </a:p>
@@ -1199,7 +1199,7 @@
           <a:p>
             <a:fld id="{A7C2C1AE-BBEA-47B0-B569-45C2E2BFACC4}" type="datetimeFigureOut">
               <a:rPr lang="pt-BR" smtClean="0"/>
-              <a:t>10/09/2022</a:t>
+              <a:t>12/09/2022</a:t>
             </a:fld>
             <a:endParaRPr lang="pt-BR"/>
           </a:p>
@@ -1443,7 +1443,7 @@
           <a:p>
             <a:fld id="{A7C2C1AE-BBEA-47B0-B569-45C2E2BFACC4}" type="datetimeFigureOut">
               <a:rPr lang="pt-BR" smtClean="0"/>
-              <a:t>10/09/2022</a:t>
+              <a:t>12/09/2022</a:t>
             </a:fld>
             <a:endParaRPr lang="pt-BR"/>
           </a:p>
@@ -1675,7 +1675,7 @@
           <a:p>
             <a:fld id="{A7C2C1AE-BBEA-47B0-B569-45C2E2BFACC4}" type="datetimeFigureOut">
               <a:rPr lang="pt-BR" smtClean="0"/>
-              <a:t>10/09/2022</a:t>
+              <a:t>12/09/2022</a:t>
             </a:fld>
             <a:endParaRPr lang="pt-BR"/>
           </a:p>
@@ -2042,7 +2042,7 @@
           <a:p>
             <a:fld id="{A7C2C1AE-BBEA-47B0-B569-45C2E2BFACC4}" type="datetimeFigureOut">
               <a:rPr lang="pt-BR" smtClean="0"/>
-              <a:t>10/09/2022</a:t>
+              <a:t>12/09/2022</a:t>
             </a:fld>
             <a:endParaRPr lang="pt-BR"/>
           </a:p>
@@ -2160,7 +2160,7 @@
           <a:p>
             <a:fld id="{A7C2C1AE-BBEA-47B0-B569-45C2E2BFACC4}" type="datetimeFigureOut">
               <a:rPr lang="pt-BR" smtClean="0"/>
-              <a:t>10/09/2022</a:t>
+              <a:t>12/09/2022</a:t>
             </a:fld>
             <a:endParaRPr lang="pt-BR"/>
           </a:p>
@@ -2255,7 +2255,7 @@
           <a:p>
             <a:fld id="{A7C2C1AE-BBEA-47B0-B569-45C2E2BFACC4}" type="datetimeFigureOut">
               <a:rPr lang="pt-BR" smtClean="0"/>
-              <a:t>10/09/2022</a:t>
+              <a:t>12/09/2022</a:t>
             </a:fld>
             <a:endParaRPr lang="pt-BR"/>
           </a:p>
@@ -2532,7 +2532,7 @@
           <a:p>
             <a:fld id="{A7C2C1AE-BBEA-47B0-B569-45C2E2BFACC4}" type="datetimeFigureOut">
               <a:rPr lang="pt-BR" smtClean="0"/>
-              <a:t>10/09/2022</a:t>
+              <a:t>12/09/2022</a:t>
             </a:fld>
             <a:endParaRPr lang="pt-BR"/>
           </a:p>
@@ -2789,7 +2789,7 @@
           <a:p>
             <a:fld id="{A7C2C1AE-BBEA-47B0-B569-45C2E2BFACC4}" type="datetimeFigureOut">
               <a:rPr lang="pt-BR" smtClean="0"/>
-              <a:t>10/09/2022</a:t>
+              <a:t>12/09/2022</a:t>
             </a:fld>
             <a:endParaRPr lang="pt-BR"/>
           </a:p>
@@ -3002,7 +3002,7 @@
           <a:p>
             <a:fld id="{A7C2C1AE-BBEA-47B0-B569-45C2E2BFACC4}" type="datetimeFigureOut">
               <a:rPr lang="pt-BR" smtClean="0"/>
-              <a:t>10/09/2022</a:t>
+              <a:t>12/09/2022</a:t>
             </a:fld>
             <a:endParaRPr lang="pt-BR"/>
           </a:p>
@@ -3431,7 +3431,7 @@
         </p:nvSpPr>
         <p:spPr>
           <a:xfrm>
-            <a:off x="1283954" y="9497613"/>
+            <a:off x="1283954" y="8314299"/>
             <a:ext cx="14381475" cy="6595987"/>
           </a:xfrm>
           <a:prstGeom prst="rect">
@@ -3892,7 +3892,7 @@
         </p:nvSpPr>
         <p:spPr>
           <a:xfrm>
-            <a:off x="1259287" y="16020975"/>
+            <a:off x="1298096" y="14794124"/>
             <a:ext cx="14386121" cy="848160"/>
           </a:xfrm>
           <a:prstGeom prst="rect">
@@ -3963,7 +3963,7 @@
         </p:nvSpPr>
         <p:spPr>
           <a:xfrm>
-            <a:off x="1259287" y="17072395"/>
+            <a:off x="1299202" y="15760650"/>
             <a:ext cx="14369761" cy="1144581"/>
           </a:xfrm>
           <a:prstGeom prst="rect">
@@ -4092,18 +4092,19 @@
               </a:spcAft>
             </a:pPr>
             <a:r>
-              <a:rPr lang="pt-BR" sz="3600" b="0" strike="noStrike" spc="-1" dirty="0">
-                <a:solidFill>
-                  <a:srgbClr val="000000"/>
-                </a:solidFill>
-                <a:latin typeface="Arial"/>
-                <a:ea typeface="Calibri"/>
-              </a:rPr>
-              <a:t>Internet das Coisas. Big Data. Sustentabilidade Social. Sustentabilidade Ambiental. Sustentabilidade Econômica.</a:t>
+              <a:rPr lang="pt-BR" sz="3600" b="0" i="0" dirty="0">
+                <a:solidFill>
+                  <a:srgbClr val="000000"/>
+                </a:solidFill>
+                <a:effectLst/>
+                <a:latin typeface="Arial" panose="020B0604020202020204" pitchFamily="34" charset="0"/>
+                <a:cs typeface="Arial" panose="020B0604020202020204" pitchFamily="34" charset="0"/>
+              </a:rPr>
+              <a:t>Gestão de recursos hídricos; Bacias hidrográficas inteligentes, Cidades inteligentes, Tecnologias da informação e comunicação.</a:t>
             </a:r>
             <a:endParaRPr lang="pt-BR" sz="3600" b="0" strike="noStrike" spc="-1" dirty="0">
-              <a:latin typeface="Arial"/>
-              <a:cs typeface="Arial"/>
+              <a:latin typeface="Arial" panose="020B0604020202020204" pitchFamily="34" charset="0"/>
+              <a:cs typeface="Arial" panose="020B0604020202020204" pitchFamily="34" charset="0"/>
             </a:endParaRPr>
           </a:p>
         </p:txBody>
@@ -4122,7 +4123,7 @@
         </p:nvSpPr>
         <p:spPr>
           <a:xfrm>
-            <a:off x="1283954" y="18282444"/>
+            <a:off x="1283954" y="17036347"/>
             <a:ext cx="14400263" cy="848160"/>
           </a:xfrm>
           <a:prstGeom prst="rect">
@@ -4193,8 +4194,8 @@
         </p:nvSpPr>
         <p:spPr>
           <a:xfrm>
-            <a:off x="1259287" y="19130604"/>
-            <a:ext cx="14449599" cy="16710813"/>
+            <a:off x="1259284" y="17886056"/>
+            <a:ext cx="14449599" cy="17818809"/>
           </a:xfrm>
           <a:prstGeom prst="rect">
             <a:avLst/>
@@ -4322,164 +4323,209 @@
               </a:spcAft>
             </a:pPr>
             <a:r>
-              <a:rPr lang="pt-BR" sz="3600" dirty="0"/>
+              <a:rPr lang="pt-BR" sz="3600" dirty="0">
+                <a:latin typeface="Arial" panose="020B0604020202020204" pitchFamily="34" charset="0"/>
+                <a:cs typeface="Arial" panose="020B0604020202020204" pitchFamily="34" charset="0"/>
+              </a:rPr>
               <a:t>Quando o crescimento econômico é desenvolvido de modo sustentável </a:t>
             </a:r>
             <a:r>
               <a:rPr lang="pt-BR" sz="3600" dirty="0">
                 <a:effectLst/>
+                <a:latin typeface="Arial" panose="020B0604020202020204" pitchFamily="34" charset="0"/>
+                <a:cs typeface="Arial" panose="020B0604020202020204" pitchFamily="34" charset="0"/>
               </a:rPr>
               <a:t>proporcionando qualidade de vida juntamente de uma infraestrutura moderna é possível relacionar essa situação com o conceito de cidade inteligente (</a:t>
             </a:r>
             <a:r>
               <a:rPr lang="pt-BR" sz="3600" dirty="0" err="1">
                 <a:effectLst/>
+                <a:latin typeface="Arial" panose="020B0604020202020204" pitchFamily="34" charset="0"/>
+                <a:cs typeface="Arial" panose="020B0604020202020204" pitchFamily="34" charset="0"/>
               </a:rPr>
               <a:t>Caragliu</a:t>
             </a:r>
             <a:r>
               <a:rPr lang="pt-BR" sz="3600" dirty="0">
                 <a:effectLst/>
-              </a:rPr>
-              <a:t> et al., 2011). Segundo </a:t>
+                <a:latin typeface="Arial" panose="020B0604020202020204" pitchFamily="34" charset="0"/>
+                <a:cs typeface="Arial" panose="020B0604020202020204" pitchFamily="34" charset="0"/>
+              </a:rPr>
+              <a:t>, 2011). Segundo </a:t>
             </a:r>
             <a:r>
               <a:rPr lang="pt-BR" sz="3600" dirty="0" err="1">
                 <a:effectLst/>
+                <a:latin typeface="Arial" panose="020B0604020202020204" pitchFamily="34" charset="0"/>
+                <a:cs typeface="Arial" panose="020B0604020202020204" pitchFamily="34" charset="0"/>
               </a:rPr>
               <a:t>Nan</a:t>
             </a:r>
             <a:r>
               <a:rPr lang="pt-BR" sz="3600" dirty="0">
                 <a:effectLst/>
+                <a:latin typeface="Arial" panose="020B0604020202020204" pitchFamily="34" charset="0"/>
+                <a:cs typeface="Arial" panose="020B0604020202020204" pitchFamily="34" charset="0"/>
               </a:rPr>
               <a:t> e Pardo (2011), cidades inteligentes devem possuir sistemas integrados com soluções inovadoras com a finalidade de proporcionar melhoria na qualidade dos serviços oferecidos aos cidadãos. </a:t>
             </a:r>
             <a:r>
-              <a:rPr lang="pt-BR" sz="3600" dirty="0"/>
+              <a:rPr lang="pt-BR" sz="3600" dirty="0">
+                <a:latin typeface="Arial" panose="020B0604020202020204" pitchFamily="34" charset="0"/>
+                <a:cs typeface="Arial" panose="020B0604020202020204" pitchFamily="34" charset="0"/>
+              </a:rPr>
               <a:t>Através de soluções inovadoras e das </a:t>
             </a:r>
             <a:r>
               <a:rPr lang="pt-BR" sz="3600" dirty="0">
                 <a:effectLst/>
-              </a:rPr>
-              <a:t>facilidades das Tecnologias da Informação e Comunicação, </a:t>
+                <a:latin typeface="Arial" panose="020B0604020202020204" pitchFamily="34" charset="0"/>
+                <a:cs typeface="Arial" panose="020B0604020202020204" pitchFamily="34" charset="0"/>
+              </a:rPr>
+              <a:t>facilidades das TIC (Tecnologias da Informação e Comunicação), </a:t>
             </a:r>
             <a:r>
               <a:rPr lang="pt-BR" sz="3600" dirty="0" err="1">
                 <a:effectLst/>
+                <a:latin typeface="Arial" panose="020B0604020202020204" pitchFamily="34" charset="0"/>
+                <a:cs typeface="Arial" panose="020B0604020202020204" pitchFamily="34" charset="0"/>
               </a:rPr>
               <a:t>Toppeta</a:t>
             </a:r>
             <a:r>
               <a:rPr lang="pt-BR" sz="3600" dirty="0">
                 <a:effectLst/>
+                <a:latin typeface="Arial" panose="020B0604020202020204" pitchFamily="34" charset="0"/>
+                <a:cs typeface="Arial" panose="020B0604020202020204" pitchFamily="34" charset="0"/>
               </a:rPr>
               <a:t> (2010) assegura que é possível gerenciar a complexidade das cidades. </a:t>
             </a:r>
             <a:r>
               <a:rPr lang="pt-BR" sz="3600" dirty="0" err="1">
                 <a:effectLst/>
+                <a:latin typeface="Arial" panose="020B0604020202020204" pitchFamily="34" charset="0"/>
+                <a:cs typeface="Arial" panose="020B0604020202020204" pitchFamily="34" charset="0"/>
               </a:rPr>
               <a:t>Yigitcanlar</a:t>
             </a:r>
             <a:r>
               <a:rPr lang="pt-BR" sz="3600" dirty="0">
                 <a:effectLst/>
-              </a:rPr>
-              <a:t> et al (2018) complementam ao afirmar que a combinação de capital humano, capital social e TIC contribuem para o desenvolvimento de políticas públicas e desenvolvimento sustentável que permitem melhor convívio da sociedade reforçando o conceito de cidades inteligentes e sustentáveis. Uma das grandes barreiras no gerenciamento complexo de cidades é o </a:t>
-            </a:r>
-            <a:r>
-              <a:rPr lang="pt-BR" sz="3600" dirty="0"/>
+                <a:latin typeface="Arial" panose="020B0604020202020204" pitchFamily="34" charset="0"/>
+                <a:cs typeface="Arial" panose="020B0604020202020204" pitchFamily="34" charset="0"/>
+              </a:rPr>
+              <a:t> (2018) complementam ao afirmar que a combinação de capital humano, capital social e TIC contribuem para o desenvolvimento de políticas públicas e desenvolvimento sustentável que permitem melhor convívio da sociedade reforçando o conceito de cidades inteligentes e sustentáveis. Uma das grandes barreiras no gerenciamento complexo de cidades é o </a:t>
+            </a:r>
+            <a:r>
+              <a:rPr lang="pt-BR" sz="3600" dirty="0">
+                <a:latin typeface="Arial" panose="020B0604020202020204" pitchFamily="34" charset="0"/>
+                <a:cs typeface="Arial" panose="020B0604020202020204" pitchFamily="34" charset="0"/>
+              </a:rPr>
               <a:t>fornecimento de insumos, e diante das mudanças climáticas, a crise hídrica se torna um forte agravante. </a:t>
             </a:r>
             <a:r>
               <a:rPr lang="pt-BR" sz="3600" dirty="0">
                 <a:effectLst/>
+                <a:latin typeface="Arial" panose="020B0604020202020204" pitchFamily="34" charset="0"/>
+                <a:cs typeface="Arial" panose="020B0604020202020204" pitchFamily="34" charset="0"/>
               </a:rPr>
               <a:t>Para </a:t>
             </a:r>
             <a:r>
               <a:rPr lang="pt-BR" sz="3600" dirty="0" err="1">
                 <a:effectLst/>
+                <a:latin typeface="Arial" panose="020B0604020202020204" pitchFamily="34" charset="0"/>
+                <a:cs typeface="Arial" panose="020B0604020202020204" pitchFamily="34" charset="0"/>
               </a:rPr>
               <a:t>Gleick</a:t>
             </a:r>
             <a:r>
               <a:rPr lang="pt-BR" sz="3600" dirty="0">
                 <a:effectLst/>
+                <a:latin typeface="Arial" panose="020B0604020202020204" pitchFamily="34" charset="0"/>
+                <a:cs typeface="Arial" panose="020B0604020202020204" pitchFamily="34" charset="0"/>
               </a:rPr>
               <a:t> e </a:t>
             </a:r>
             <a:r>
               <a:rPr lang="pt-BR" sz="3600" dirty="0" err="1">
                 <a:effectLst/>
+                <a:latin typeface="Arial" panose="020B0604020202020204" pitchFamily="34" charset="0"/>
+                <a:cs typeface="Arial" panose="020B0604020202020204" pitchFamily="34" charset="0"/>
               </a:rPr>
               <a:t>Iceland</a:t>
             </a:r>
             <a:r>
               <a:rPr lang="pt-BR" sz="3600" dirty="0">
                 <a:effectLst/>
+                <a:latin typeface="Arial" panose="020B0604020202020204" pitchFamily="34" charset="0"/>
+                <a:cs typeface="Arial" panose="020B0604020202020204" pitchFamily="34" charset="0"/>
               </a:rPr>
               <a:t> (2018) a segurança hídrica ocorre quando se é garantido quantidade, qualidade e volumes consistentes necessários de água aos consumidores. Mediante a situação, a disponibilidade de água presente em bacias hidrográficas abastece não somente popula</a:t>
             </a:r>
             <a:r>
-              <a:rPr lang="pt-BR" sz="3600" dirty="0"/>
+              <a:rPr lang="pt-BR" sz="3600" dirty="0">
+                <a:latin typeface="Arial" panose="020B0604020202020204" pitchFamily="34" charset="0"/>
+                <a:cs typeface="Arial" panose="020B0604020202020204" pitchFamily="34" charset="0"/>
+              </a:rPr>
               <a:t>ções urbanas, mas também rurais e a todos os seres vivos que dependem de água para sua sobrevivência. </a:t>
             </a:r>
             <a:r>
               <a:rPr lang="pt-BR" sz="3600" dirty="0">
                 <a:effectLst/>
+                <a:latin typeface="Arial" panose="020B0604020202020204" pitchFamily="34" charset="0"/>
+                <a:cs typeface="Arial" panose="020B0604020202020204" pitchFamily="34" charset="0"/>
               </a:rPr>
               <a:t>Borsato e </a:t>
             </a:r>
             <a:r>
               <a:rPr lang="pt-BR" sz="3600" dirty="0" err="1">
                 <a:effectLst/>
+                <a:latin typeface="Arial" panose="020B0604020202020204" pitchFamily="34" charset="0"/>
+                <a:cs typeface="Arial" panose="020B0604020202020204" pitchFamily="34" charset="0"/>
               </a:rPr>
               <a:t>Martoni</a:t>
             </a:r>
             <a:r>
               <a:rPr lang="pt-BR" sz="3600" dirty="0">
                 <a:effectLst/>
+                <a:latin typeface="Arial" panose="020B0604020202020204" pitchFamily="34" charset="0"/>
+                <a:cs typeface="Arial" panose="020B0604020202020204" pitchFamily="34" charset="0"/>
               </a:rPr>
               <a:t> (2004) definem bacias hidrográficas como uma área delimitada por divisores de água, que agem como uma captura natural da água</a:t>
             </a:r>
             <a:r>
               <a:rPr lang="pt-BR" sz="3600" spc="-1" dirty="0">
                 <a:effectLst/>
-                <a:latin typeface="Arial"/>
+                <a:latin typeface="Arial" panose="020B0604020202020204" pitchFamily="34" charset="0"/>
                 <a:ea typeface="Microsoft YaHei"/>
+                <a:cs typeface="Arial" panose="020B0604020202020204" pitchFamily="34" charset="0"/>
               </a:rPr>
               <a:t>. </a:t>
             </a:r>
             <a:r>
               <a:rPr lang="pt-BR" sz="3600" dirty="0">
                 <a:effectLst/>
+                <a:latin typeface="Arial" panose="020B0604020202020204" pitchFamily="34" charset="0"/>
+                <a:cs typeface="Arial" panose="020B0604020202020204" pitchFamily="34" charset="0"/>
               </a:rPr>
               <a:t>Segundo Porto e Porto (2008), uma bacia hidrográfica é um sistema que possui como entrada a precipitação da água da chuva e como saída a água que decorre do </a:t>
             </a:r>
             <a:r>
               <a:rPr lang="pt-BR" sz="3600" dirty="0" err="1">
                 <a:effectLst/>
+                <a:latin typeface="Arial" panose="020B0604020202020204" pitchFamily="34" charset="0"/>
+                <a:cs typeface="Arial" panose="020B0604020202020204" pitchFamily="34" charset="0"/>
               </a:rPr>
               <a:t>exutório</a:t>
             </a:r>
             <a:r>
               <a:rPr lang="pt-BR" sz="3600" dirty="0">
                 <a:effectLst/>
-              </a:rPr>
-              <a:t> no delineamento de bacias e sub-bacias interconectadas pelos sistemas hídricos. Guerra e Cunha (1996) descrevem que as bacias hidrográficas são unidades de gestão e integração dos elementos naturais e sociais, ou seja, pode-se acompanhar as mudanças feitas pelo homem e as respectivas respostas da natureza.</a:t>
-            </a:r>
-            <a:r>
-              <a:rPr lang="pt-BR" sz="3600" dirty="0"/>
-              <a:t> </a:t>
-            </a:r>
-            <a:r>
-              <a:rPr lang="pt-BR" sz="3600" dirty="0">
-                <a:effectLst/>
-              </a:rPr>
-              <a:t>Assim, diante  da  complexidade desta  temática,  será</a:t>
+                <a:latin typeface="Arial" panose="020B0604020202020204" pitchFamily="34" charset="0"/>
+                <a:cs typeface="Arial" panose="020B0604020202020204" pitchFamily="34" charset="0"/>
+              </a:rPr>
+              <a:t> no delineamento de bacias e sub-bacias interconectadas pelos sistemas hídricos. Guerra e Cunha (1996) descrevem que as bacias hidrográficas são unidades de gestão e integração dos elementos naturais e sociais, ou seja, pode-se acompanhar  as   mudanças   feitas   pelo   homem  e  as  respectivas</a:t>
             </a:r>
           </a:p>
         </p:txBody>
@@ -4498,7 +4544,7 @@
         </p:nvSpPr>
         <p:spPr>
           <a:xfrm>
-            <a:off x="16809157" y="12918719"/>
+            <a:off x="16890241" y="11615000"/>
             <a:ext cx="14324841" cy="848160"/>
           </a:xfrm>
           <a:prstGeom prst="rect">
@@ -4569,8 +4615,8 @@
         </p:nvSpPr>
         <p:spPr>
           <a:xfrm>
-            <a:off x="16838838" y="13924110"/>
-            <a:ext cx="14295160" cy="1779290"/>
+            <a:off x="16872220" y="12522533"/>
+            <a:ext cx="14295160" cy="2718786"/>
           </a:xfrm>
           <a:prstGeom prst="rect">
             <a:avLst/>
@@ -4698,36 +4744,20 @@
               </a:spcAft>
             </a:pPr>
             <a:r>
-              <a:rPr lang="pt-BR" sz="3600" spc="-1" dirty="0">
-                <a:solidFill>
-                  <a:srgbClr val="000000"/>
-                </a:solidFill>
-                <a:latin typeface="Arial"/>
-                <a:ea typeface="Microsoft YaHei"/>
-              </a:rPr>
-              <a:t>O projeto de iniciação científica propõe-se a estudar </a:t>
-            </a:r>
-            <a:r>
-              <a:rPr lang="pt-BR" sz="3600" spc="-1" dirty="0" err="1">
-                <a:solidFill>
-                  <a:srgbClr val="000000"/>
-                </a:solidFill>
-                <a:latin typeface="Arial"/>
-                <a:ea typeface="Microsoft YaHei"/>
-              </a:rPr>
-              <a:t>IoT</a:t>
-            </a:r>
-            <a:r>
-              <a:rPr lang="pt-BR" sz="3600" spc="-1" dirty="0">
-                <a:solidFill>
-                  <a:srgbClr val="000000"/>
-                </a:solidFill>
-                <a:latin typeface="Arial"/>
-                <a:ea typeface="Microsoft YaHei"/>
-              </a:rPr>
-              <a:t>, Big Data e suas aplicações buscando relacionar como essas TIC, podem contribuir com a sustentabilidade econômica, social e ambiental. </a:t>
-            </a:r>
-            <a:endParaRPr lang="pt-BR" dirty="0"/>
+              <a:rPr lang="pt-BR" sz="3600" b="0" i="0" dirty="0">
+                <a:solidFill>
+                  <a:srgbClr val="000000"/>
+                </a:solidFill>
+                <a:effectLst/>
+                <a:latin typeface="Arial" panose="020B0604020202020204" pitchFamily="34" charset="0"/>
+                <a:cs typeface="Arial" panose="020B0604020202020204" pitchFamily="34" charset="0"/>
+              </a:rPr>
+              <a:t>Assim esse projeto tem como objetivo estudar os conceitos e aplicações de TIC sobre cidades inteligentes e verificar como eles podem contribuir para a criação de aplicações de TIC úteis e que possam ser utilizadas nas bacias hidrográficas no sentido de contribuir para melhorar a gestão de recursos hídricos.</a:t>
+            </a:r>
+            <a:endParaRPr lang="pt-BR" dirty="0">
+              <a:latin typeface="Arial" panose="020B0604020202020204" pitchFamily="34" charset="0"/>
+              <a:cs typeface="Arial" panose="020B0604020202020204" pitchFamily="34" charset="0"/>
+            </a:endParaRPr>
           </a:p>
         </p:txBody>
       </p:sp>
@@ -4745,7 +4775,7 @@
         </p:nvSpPr>
         <p:spPr>
           <a:xfrm>
-            <a:off x="16809156" y="15920760"/>
+            <a:off x="16849698" y="15410227"/>
             <a:ext cx="14324842" cy="848160"/>
           </a:xfrm>
           <a:prstGeom prst="rect">
@@ -4816,7 +4846,7 @@
         </p:nvSpPr>
         <p:spPr>
           <a:xfrm>
-            <a:off x="16834338" y="16926151"/>
+            <a:off x="16849699" y="16389295"/>
             <a:ext cx="14340202" cy="2581650"/>
           </a:xfrm>
           <a:prstGeom prst="rect">
@@ -4976,7 +5006,7 @@
         </p:nvSpPr>
         <p:spPr>
           <a:xfrm>
-            <a:off x="16809156" y="20821835"/>
+            <a:off x="16890241" y="20085252"/>
             <a:ext cx="14309040" cy="3338950"/>
           </a:xfrm>
           <a:prstGeom prst="rect">
@@ -5105,52 +5135,23 @@
               </a:spcAft>
             </a:pPr>
             <a:r>
-              <a:rPr lang="pt-BR" sz="3600" b="0" strike="noStrike" spc="-1" dirty="0">
-                <a:solidFill>
-                  <a:srgbClr val="000000"/>
-                </a:solidFill>
-                <a:latin typeface="Arial"/>
-                <a:ea typeface="Calibri"/>
-              </a:rPr>
-              <a:t>Espera-se no decorrer deste trabalho de Iniciação Científica, além do cumprimento do cronograma e da proposta de relação entre os conceitos e aplicações estudadas, desenvolver no estudante</a:t>
-            </a:r>
-            <a:r>
-              <a:rPr lang="pt-BR" sz="3600" spc="-1" dirty="0">
-                <a:solidFill>
-                  <a:srgbClr val="000000"/>
-                </a:solidFill>
-                <a:latin typeface="Arial"/>
-                <a:ea typeface="Calibri"/>
-              </a:rPr>
-              <a:t>:</a:t>
-            </a:r>
-            <a:r>
-              <a:rPr lang="pt-BR" sz="3600" b="0" strike="noStrike" spc="-1" dirty="0">
-                <a:solidFill>
-                  <a:srgbClr val="000000"/>
-                </a:solidFill>
-                <a:latin typeface="Arial"/>
-                <a:ea typeface="Calibri"/>
-              </a:rPr>
-              <a:t> espírito investigativo, autonomia intelectual e capacidade de sistematização dos vários saberes com os quais estará interagindo ao longo da vigência do projeto.</a:t>
-            </a:r>
-            <a:endParaRPr lang="pt-BR" dirty="0"/>
-          </a:p>
-          <a:p>
-            <a:pPr algn="just">
-              <a:lnSpc>
-                <a:spcPct val="107000"/>
-              </a:lnSpc>
-              <a:spcAft>
-                <a:spcPts val="799"/>
-              </a:spcAft>
-            </a:pPr>
+              <a:rPr lang="pt-BR" sz="3600" b="0" i="0" dirty="0">
+                <a:solidFill>
+                  <a:srgbClr val="000000"/>
+                </a:solidFill>
+                <a:effectLst/>
+                <a:latin typeface="Arial" panose="020B0604020202020204" pitchFamily="34" charset="0"/>
+                <a:cs typeface="Arial" panose="020B0604020202020204" pitchFamily="34" charset="0"/>
+              </a:rPr>
+              <a:t>Espera-se no decorrer deste trabalho de Iniciação Científica, além do cumprimento do cronograma e do objetivo do trabalho, desenvolver no estudante espírito investigativo, autonomia intelectual e capacidade de sistematização dos vários saberes com os quais estará interagindo ao longo da vigência do projeto.</a:t>
+            </a:r>
             <a:endParaRPr lang="pt-BR" sz="3600" b="0" strike="noStrike" spc="-1" dirty="0">
               <a:solidFill>
                 <a:srgbClr val="000000"/>
               </a:solidFill>
-              <a:latin typeface="Arial"/>
+              <a:latin typeface="Arial" panose="020B0604020202020204" pitchFamily="34" charset="0"/>
               <a:ea typeface="Calibri"/>
+              <a:cs typeface="Arial" panose="020B0604020202020204" pitchFamily="34" charset="0"/>
             </a:endParaRPr>
           </a:p>
           <a:p>
@@ -5195,7 +5196,7 @@
         </p:nvSpPr>
         <p:spPr>
           <a:xfrm>
-            <a:off x="16809156" y="19807243"/>
+            <a:off x="16849698" y="19237092"/>
             <a:ext cx="14324842" cy="848160"/>
           </a:xfrm>
           <a:prstGeom prst="rect">
@@ -5266,7 +5267,7 @@
         </p:nvSpPr>
         <p:spPr>
           <a:xfrm>
-            <a:off x="16793354" y="24493650"/>
+            <a:off x="16890241" y="22897080"/>
             <a:ext cx="14324842" cy="848160"/>
           </a:xfrm>
           <a:prstGeom prst="rect">
@@ -5337,7 +5338,7 @@
         </p:nvSpPr>
         <p:spPr>
           <a:xfrm>
-            <a:off x="16834338" y="25613068"/>
+            <a:off x="16890241" y="23880479"/>
             <a:ext cx="14299660" cy="10033124"/>
           </a:xfrm>
           <a:prstGeom prst="rect">
@@ -5470,6 +5471,86 @@
                 <a:latin typeface="Arial" panose="020B0604020202020204" pitchFamily="34" charset="0"/>
                 <a:cs typeface="Arial" panose="020B0604020202020204" pitchFamily="34" charset="0"/>
               </a:rPr>
+              <a:t>BORSATO, F.; MARTONI, A. M., Estudo da fisiografia das bacias hidrográficas urbanas no Município de Maringá, Estado do Paraná, Acta </a:t>
+            </a:r>
+            <a:r>
+              <a:rPr lang="pt-BR" sz="2600" b="0" i="0" dirty="0" err="1">
+                <a:solidFill>
+                  <a:srgbClr val="000000"/>
+                </a:solidFill>
+                <a:effectLst/>
+                <a:latin typeface="Arial" panose="020B0604020202020204" pitchFamily="34" charset="0"/>
+                <a:cs typeface="Arial" panose="020B0604020202020204" pitchFamily="34" charset="0"/>
+              </a:rPr>
+              <a:t>Scientiarum</a:t>
+            </a:r>
+            <a:r>
+              <a:rPr lang="pt-BR" sz="2600" b="0" i="0" dirty="0">
+                <a:solidFill>
+                  <a:srgbClr val="000000"/>
+                </a:solidFill>
+                <a:effectLst/>
+                <a:latin typeface="Arial" panose="020B0604020202020204" pitchFamily="34" charset="0"/>
+                <a:cs typeface="Arial" panose="020B0604020202020204" pitchFamily="34" charset="0"/>
+              </a:rPr>
+              <a:t> </a:t>
+            </a:r>
+            <a:r>
+              <a:rPr lang="pt-BR" sz="2600" b="0" i="0" dirty="0" err="1">
+                <a:solidFill>
+                  <a:srgbClr val="000000"/>
+                </a:solidFill>
+                <a:effectLst/>
+                <a:latin typeface="Arial" panose="020B0604020202020204" pitchFamily="34" charset="0"/>
+                <a:cs typeface="Arial" panose="020B0604020202020204" pitchFamily="34" charset="0"/>
+              </a:rPr>
+              <a:t>Human</a:t>
+            </a:r>
+            <a:r>
+              <a:rPr lang="pt-BR" sz="2600" b="0" i="0" dirty="0">
+                <a:solidFill>
+                  <a:srgbClr val="000000"/>
+                </a:solidFill>
+                <a:effectLst/>
+                <a:latin typeface="Arial" panose="020B0604020202020204" pitchFamily="34" charset="0"/>
+                <a:cs typeface="Arial" panose="020B0604020202020204" pitchFamily="34" charset="0"/>
+              </a:rPr>
+              <a:t> </a:t>
+            </a:r>
+            <a:r>
+              <a:rPr lang="pt-BR" sz="2600" b="0" i="0" dirty="0" err="1">
+                <a:solidFill>
+                  <a:srgbClr val="000000"/>
+                </a:solidFill>
+                <a:effectLst/>
+                <a:latin typeface="Arial" panose="020B0604020202020204" pitchFamily="34" charset="0"/>
+                <a:cs typeface="Arial" panose="020B0604020202020204" pitchFamily="34" charset="0"/>
+              </a:rPr>
+              <a:t>and</a:t>
+            </a:r>
+            <a:r>
+              <a:rPr lang="pt-BR" sz="2600" b="0" i="0" dirty="0">
+                <a:solidFill>
+                  <a:srgbClr val="000000"/>
+                </a:solidFill>
+                <a:effectLst/>
+                <a:latin typeface="Arial" panose="020B0604020202020204" pitchFamily="34" charset="0"/>
+                <a:cs typeface="Arial" panose="020B0604020202020204" pitchFamily="34" charset="0"/>
+              </a:rPr>
+              <a:t> Social Science, 2008, DOI: 10.4025/actascihumansoc.v26i2.1391.</a:t>
+            </a:r>
+          </a:p>
+          <a:p>
+            <a:pPr algn="just"/>
+            <a:r>
+              <a:rPr lang="pt-BR" sz="2600" b="0" i="0" dirty="0">
+                <a:solidFill>
+                  <a:srgbClr val="000000"/>
+                </a:solidFill>
+                <a:effectLst/>
+                <a:latin typeface="Arial" panose="020B0604020202020204" pitchFamily="34" charset="0"/>
+                <a:cs typeface="Arial" panose="020B0604020202020204" pitchFamily="34" charset="0"/>
+              </a:rPr>
               <a:t>CARAGLIU, A.; DEL BO, C.; NIJKAMP, P. . </a:t>
             </a:r>
             <a:r>
@@ -5602,8 +5683,11 @@
                 <a:latin typeface="Arial" panose="020B0604020202020204" pitchFamily="34" charset="0"/>
                 <a:cs typeface="Arial" panose="020B0604020202020204" pitchFamily="34" charset="0"/>
               </a:rPr>
-              <a:t> Technology, 2011. Vol. 2, n. 18, p. 65-82. DOI </a:t>
-            </a:r>
+              <a:t> Technology, 2011. Vol. 2, n. 18, p. 65-82. DOI http://dx.doi.org/10.1080/10630732.2011.601117.</a:t>
+            </a:r>
+          </a:p>
+          <a:p>
+            <a:pPr algn="just"/>
             <a:r>
               <a:rPr lang="pt-BR" sz="2600" b="0" i="0" dirty="0">
                 <a:solidFill>
@@ -5612,9 +5696,19 @@
                 <a:effectLst/>
                 <a:latin typeface="Arial" panose="020B0604020202020204" pitchFamily="34" charset="0"/>
                 <a:cs typeface="Arial" panose="020B0604020202020204" pitchFamily="34" charset="0"/>
-                <a:hlinkClick r:id="rId3"/>
-              </a:rPr>
-              <a:t>http://dx.doi.org/10.1080/10630732.2011.601117</a:t>
+              </a:rPr>
+              <a:t>GIBSON, R. B. et al. </a:t>
+            </a:r>
+            <a:r>
+              <a:rPr lang="pt-BR" sz="2600" b="0" i="0" dirty="0" err="1">
+                <a:solidFill>
+                  <a:srgbClr val="000000"/>
+                </a:solidFill>
+                <a:effectLst/>
+                <a:latin typeface="Arial" panose="020B0604020202020204" pitchFamily="34" charset="0"/>
+                <a:cs typeface="Arial" panose="020B0604020202020204" pitchFamily="34" charset="0"/>
+              </a:rPr>
+              <a:t>Sustainability</a:t>
             </a:r>
             <a:r>
               <a:rPr lang="pt-BR" sz="2600" b="0" i="0" dirty="0">
@@ -5625,18 +5719,132 @@
                 <a:latin typeface="Arial" panose="020B0604020202020204" pitchFamily="34" charset="0"/>
                 <a:cs typeface="Arial" panose="020B0604020202020204" pitchFamily="34" charset="0"/>
               </a:rPr>
-              <a:t>.</a:t>
+              <a:t> Assessment: </a:t>
+            </a:r>
+            <a:r>
+              <a:rPr lang="pt-BR" sz="2600" b="0" i="0" dirty="0" err="1">
+                <a:solidFill>
+                  <a:srgbClr val="000000"/>
+                </a:solidFill>
+                <a:effectLst/>
+                <a:latin typeface="Arial" panose="020B0604020202020204" pitchFamily="34" charset="0"/>
+                <a:cs typeface="Arial" panose="020B0604020202020204" pitchFamily="34" charset="0"/>
+              </a:rPr>
+              <a:t>Criteria</a:t>
+            </a:r>
+            <a:r>
+              <a:rPr lang="pt-BR" sz="2600" b="0" i="0" dirty="0">
+                <a:solidFill>
+                  <a:srgbClr val="000000"/>
+                </a:solidFill>
+                <a:effectLst/>
+                <a:latin typeface="Arial" panose="020B0604020202020204" pitchFamily="34" charset="0"/>
+                <a:cs typeface="Arial" panose="020B0604020202020204" pitchFamily="34" charset="0"/>
+              </a:rPr>
+              <a:t>, Processes </a:t>
+            </a:r>
+            <a:r>
+              <a:rPr lang="pt-BR" sz="2600" b="0" i="0" dirty="0" err="1">
+                <a:solidFill>
+                  <a:srgbClr val="000000"/>
+                </a:solidFill>
+                <a:effectLst/>
+                <a:latin typeface="Arial" panose="020B0604020202020204" pitchFamily="34" charset="0"/>
+                <a:cs typeface="Arial" panose="020B0604020202020204" pitchFamily="34" charset="0"/>
+              </a:rPr>
+              <a:t>and</a:t>
+            </a:r>
+            <a:r>
+              <a:rPr lang="pt-BR" sz="2600" b="0" i="0" dirty="0">
+                <a:solidFill>
+                  <a:srgbClr val="000000"/>
+                </a:solidFill>
+                <a:effectLst/>
+                <a:latin typeface="Arial" panose="020B0604020202020204" pitchFamily="34" charset="0"/>
+                <a:cs typeface="Arial" panose="020B0604020202020204" pitchFamily="34" charset="0"/>
+              </a:rPr>
+              <a:t> </a:t>
+            </a:r>
+            <a:r>
+              <a:rPr lang="pt-BR" sz="2600" b="0" i="0" dirty="0" err="1">
+                <a:solidFill>
+                  <a:srgbClr val="000000"/>
+                </a:solidFill>
+                <a:effectLst/>
+                <a:latin typeface="Arial" panose="020B0604020202020204" pitchFamily="34" charset="0"/>
+                <a:cs typeface="Arial" panose="020B0604020202020204" pitchFamily="34" charset="0"/>
+              </a:rPr>
+              <a:t>Applications</a:t>
+            </a:r>
+            <a:r>
+              <a:rPr lang="pt-BR" sz="2600" b="0" i="0" dirty="0">
+                <a:solidFill>
+                  <a:srgbClr val="000000"/>
+                </a:solidFill>
+                <a:effectLst/>
+                <a:latin typeface="Arial" panose="020B0604020202020204" pitchFamily="34" charset="0"/>
+                <a:cs typeface="Arial" panose="020B0604020202020204" pitchFamily="34" charset="0"/>
+              </a:rPr>
+              <a:t>. London: </a:t>
+            </a:r>
+            <a:r>
+              <a:rPr lang="pt-BR" sz="2600" b="0" i="0" dirty="0" err="1">
+                <a:solidFill>
+                  <a:srgbClr val="000000"/>
+                </a:solidFill>
+                <a:effectLst/>
+                <a:latin typeface="Arial" panose="020B0604020202020204" pitchFamily="34" charset="0"/>
+                <a:cs typeface="Arial" panose="020B0604020202020204" pitchFamily="34" charset="0"/>
+              </a:rPr>
+              <a:t>Earthscan</a:t>
+            </a:r>
+            <a:r>
+              <a:rPr lang="pt-BR" sz="2600" b="0" i="0" dirty="0">
+                <a:solidFill>
+                  <a:srgbClr val="000000"/>
+                </a:solidFill>
+                <a:effectLst/>
+                <a:latin typeface="Arial" panose="020B0604020202020204" pitchFamily="34" charset="0"/>
+                <a:cs typeface="Arial" panose="020B0604020202020204" pitchFamily="34" charset="0"/>
+              </a:rPr>
+              <a:t>, 254 p, 2005.</a:t>
             </a:r>
           </a:p>
           <a:p>
             <a:pPr algn="just"/>
-            <a:endParaRPr lang="pt-BR" sz="2600" dirty="0">
-              <a:solidFill>
-                <a:srgbClr val="000000"/>
-              </a:solidFill>
-              <a:latin typeface="Arial" panose="020B0604020202020204" pitchFamily="34" charset="0"/>
-              <a:cs typeface="Arial" panose="020B0604020202020204" pitchFamily="34" charset="0"/>
-            </a:endParaRPr>
+            <a:r>
+              <a:rPr lang="pt-BR" sz="2600" b="0" i="0" dirty="0">
+                <a:solidFill>
+                  <a:srgbClr val="000000"/>
+                </a:solidFill>
+                <a:effectLst/>
+                <a:latin typeface="Arial" panose="020B0604020202020204" pitchFamily="34" charset="0"/>
+                <a:cs typeface="Arial" panose="020B0604020202020204" pitchFamily="34" charset="0"/>
+              </a:rPr>
+              <a:t>GIL, </a:t>
+            </a:r>
+            <a:r>
+              <a:rPr lang="pt-BR" sz="2600" b="0" i="0" dirty="0" err="1">
+                <a:solidFill>
+                  <a:srgbClr val="000000"/>
+                </a:solidFill>
+                <a:effectLst/>
+                <a:latin typeface="Arial" panose="020B0604020202020204" pitchFamily="34" charset="0"/>
+                <a:cs typeface="Arial" panose="020B0604020202020204" pitchFamily="34" charset="0"/>
+              </a:rPr>
+              <a:t>Antonio</a:t>
+            </a:r>
+            <a:r>
+              <a:rPr lang="pt-BR" sz="2600" b="0" i="0" dirty="0">
+                <a:solidFill>
+                  <a:srgbClr val="000000"/>
+                </a:solidFill>
+                <a:effectLst/>
+                <a:latin typeface="Arial" panose="020B0604020202020204" pitchFamily="34" charset="0"/>
+                <a:cs typeface="Arial" panose="020B0604020202020204" pitchFamily="34" charset="0"/>
+              </a:rPr>
+              <a:t> Carlos. Como elaborar projetos de pesquisa. São Paulo, v. 5, n. 61, p. 16-17, 2002.</a:t>
+            </a:r>
           </a:p>
           <a:p>
             <a:pPr algn="just"/>
@@ -5649,10 +5857,360 @@
                 <a:latin typeface="Arial" panose="020B0604020202020204" pitchFamily="34" charset="0"/>
                 <a:cs typeface="Arial" panose="020B0604020202020204" pitchFamily="34" charset="0"/>
               </a:rPr>
+              <a:t>GLEICK, P.; ICELAND, C. </a:t>
+            </a:r>
+            <a:r>
+              <a:rPr lang="pt-BR" sz="2600" b="0" i="0" dirty="0" err="1">
+                <a:solidFill>
+                  <a:srgbClr val="000000"/>
+                </a:solidFill>
+                <a:effectLst/>
+                <a:latin typeface="Arial" panose="020B0604020202020204" pitchFamily="34" charset="0"/>
+                <a:cs typeface="Arial" panose="020B0604020202020204" pitchFamily="34" charset="0"/>
+              </a:rPr>
+              <a:t>Water</a:t>
+            </a:r>
+            <a:r>
+              <a:rPr lang="pt-BR" sz="2600" b="0" i="0" dirty="0">
+                <a:solidFill>
+                  <a:srgbClr val="000000"/>
+                </a:solidFill>
+                <a:effectLst/>
+                <a:latin typeface="Arial" panose="020B0604020202020204" pitchFamily="34" charset="0"/>
+                <a:cs typeface="Arial" panose="020B0604020202020204" pitchFamily="34" charset="0"/>
+              </a:rPr>
+              <a:t>, Security, </a:t>
+            </a:r>
+            <a:r>
+              <a:rPr lang="pt-BR" sz="2600" b="0" i="0" dirty="0" err="1">
+                <a:solidFill>
+                  <a:srgbClr val="000000"/>
+                </a:solidFill>
+                <a:effectLst/>
+                <a:latin typeface="Arial" panose="020B0604020202020204" pitchFamily="34" charset="0"/>
+                <a:cs typeface="Arial" panose="020B0604020202020204" pitchFamily="34" charset="0"/>
+              </a:rPr>
+              <a:t>and</a:t>
+            </a:r>
+            <a:r>
+              <a:rPr lang="pt-BR" sz="2600" b="0" i="0" dirty="0">
+                <a:solidFill>
+                  <a:srgbClr val="000000"/>
+                </a:solidFill>
+                <a:effectLst/>
+                <a:latin typeface="Arial" panose="020B0604020202020204" pitchFamily="34" charset="0"/>
+                <a:cs typeface="Arial" panose="020B0604020202020204" pitchFamily="34" charset="0"/>
+              </a:rPr>
+              <a:t> </a:t>
+            </a:r>
+            <a:r>
+              <a:rPr lang="pt-BR" sz="2600" b="0" i="0" dirty="0" err="1">
+                <a:solidFill>
+                  <a:srgbClr val="000000"/>
+                </a:solidFill>
+                <a:effectLst/>
+                <a:latin typeface="Arial" panose="020B0604020202020204" pitchFamily="34" charset="0"/>
+                <a:cs typeface="Arial" panose="020B0604020202020204" pitchFamily="34" charset="0"/>
+              </a:rPr>
+              <a:t>Conflict</a:t>
+            </a:r>
+            <a:r>
+              <a:rPr lang="pt-BR" sz="2600" b="0" i="0" dirty="0">
+                <a:solidFill>
+                  <a:srgbClr val="000000"/>
+                </a:solidFill>
+                <a:effectLst/>
+                <a:latin typeface="Arial" panose="020B0604020202020204" pitchFamily="34" charset="0"/>
+                <a:cs typeface="Arial" panose="020B0604020202020204" pitchFamily="34" charset="0"/>
+              </a:rPr>
+              <a:t>. </a:t>
+            </a:r>
+            <a:r>
+              <a:rPr lang="pt-BR" sz="2600" b="0" i="0" dirty="0" err="1">
+                <a:solidFill>
+                  <a:srgbClr val="000000"/>
+                </a:solidFill>
+                <a:effectLst/>
+                <a:latin typeface="Arial" panose="020B0604020202020204" pitchFamily="34" charset="0"/>
+                <a:cs typeface="Arial" panose="020B0604020202020204" pitchFamily="34" charset="0"/>
+              </a:rPr>
+              <a:t>Issue</a:t>
+            </a:r>
+            <a:r>
+              <a:rPr lang="pt-BR" sz="2600" b="0" i="0" dirty="0">
+                <a:solidFill>
+                  <a:srgbClr val="000000"/>
+                </a:solidFill>
+                <a:effectLst/>
+                <a:latin typeface="Arial" panose="020B0604020202020204" pitchFamily="34" charset="0"/>
+                <a:cs typeface="Arial" panose="020B0604020202020204" pitchFamily="34" charset="0"/>
+              </a:rPr>
+              <a:t> </a:t>
+            </a:r>
+            <a:r>
+              <a:rPr lang="pt-BR" sz="2600" b="0" i="0" dirty="0" err="1">
+                <a:solidFill>
+                  <a:srgbClr val="000000"/>
+                </a:solidFill>
+                <a:effectLst/>
+                <a:latin typeface="Arial" panose="020B0604020202020204" pitchFamily="34" charset="0"/>
+                <a:cs typeface="Arial" panose="020B0604020202020204" pitchFamily="34" charset="0"/>
+              </a:rPr>
+              <a:t>Brief</a:t>
+            </a:r>
+            <a:r>
+              <a:rPr lang="pt-BR" sz="2600" b="0" i="0" dirty="0">
+                <a:solidFill>
+                  <a:srgbClr val="000000"/>
+                </a:solidFill>
+                <a:effectLst/>
+                <a:latin typeface="Arial" panose="020B0604020202020204" pitchFamily="34" charset="0"/>
+                <a:cs typeface="Arial" panose="020B0604020202020204" pitchFamily="34" charset="0"/>
+              </a:rPr>
+              <a:t>. World </a:t>
+            </a:r>
+            <a:r>
+              <a:rPr lang="pt-BR" sz="2600" b="0" i="0" dirty="0" err="1">
+                <a:solidFill>
+                  <a:srgbClr val="000000"/>
+                </a:solidFill>
+                <a:effectLst/>
+                <a:latin typeface="Arial" panose="020B0604020202020204" pitchFamily="34" charset="0"/>
+                <a:cs typeface="Arial" panose="020B0604020202020204" pitchFamily="34" charset="0"/>
+              </a:rPr>
+              <a:t>Resource</a:t>
+            </a:r>
+            <a:r>
+              <a:rPr lang="pt-BR" sz="2600" b="0" i="0" dirty="0">
+                <a:solidFill>
+                  <a:srgbClr val="000000"/>
+                </a:solidFill>
+                <a:effectLst/>
+                <a:latin typeface="Arial" panose="020B0604020202020204" pitchFamily="34" charset="0"/>
+                <a:cs typeface="Arial" panose="020B0604020202020204" pitchFamily="34" charset="0"/>
+              </a:rPr>
+              <a:t> </a:t>
+            </a:r>
+            <a:r>
+              <a:rPr lang="pt-BR" sz="2600" b="0" i="0" dirty="0" err="1">
+                <a:solidFill>
+                  <a:srgbClr val="000000"/>
+                </a:solidFill>
+                <a:effectLst/>
+                <a:latin typeface="Arial" panose="020B0604020202020204" pitchFamily="34" charset="0"/>
+                <a:cs typeface="Arial" panose="020B0604020202020204" pitchFamily="34" charset="0"/>
+              </a:rPr>
+              <a:t>Institute</a:t>
+            </a:r>
+            <a:r>
+              <a:rPr lang="pt-BR" sz="2600" b="0" i="0" dirty="0">
+                <a:solidFill>
+                  <a:srgbClr val="000000"/>
+                </a:solidFill>
+                <a:effectLst/>
+                <a:latin typeface="Arial" panose="020B0604020202020204" pitchFamily="34" charset="0"/>
+                <a:cs typeface="Arial" panose="020B0604020202020204" pitchFamily="34" charset="0"/>
+              </a:rPr>
+              <a:t> </a:t>
+            </a:r>
+            <a:r>
+              <a:rPr lang="pt-BR" sz="2600" b="0" i="0" dirty="0" err="1">
+                <a:solidFill>
+                  <a:srgbClr val="000000"/>
+                </a:solidFill>
+                <a:effectLst/>
+                <a:latin typeface="Arial" panose="020B0604020202020204" pitchFamily="34" charset="0"/>
+                <a:cs typeface="Arial" panose="020B0604020202020204" pitchFamily="34" charset="0"/>
+              </a:rPr>
+              <a:t>and</a:t>
+            </a:r>
+            <a:r>
+              <a:rPr lang="pt-BR" sz="2600" b="0" i="0" dirty="0">
+                <a:solidFill>
+                  <a:srgbClr val="000000"/>
+                </a:solidFill>
+                <a:effectLst/>
+                <a:latin typeface="Arial" panose="020B0604020202020204" pitchFamily="34" charset="0"/>
+                <a:cs typeface="Arial" panose="020B0604020202020204" pitchFamily="34" charset="0"/>
+              </a:rPr>
+              <a:t> Pacific </a:t>
+            </a:r>
+            <a:r>
+              <a:rPr lang="pt-BR" sz="2600" b="0" i="0" dirty="0" err="1">
+                <a:solidFill>
+                  <a:srgbClr val="000000"/>
+                </a:solidFill>
+                <a:effectLst/>
+                <a:latin typeface="Arial" panose="020B0604020202020204" pitchFamily="34" charset="0"/>
+                <a:cs typeface="Arial" panose="020B0604020202020204" pitchFamily="34" charset="0"/>
+              </a:rPr>
+              <a:t>Institute</a:t>
+            </a:r>
+            <a:r>
+              <a:rPr lang="pt-BR" sz="2600" b="0" i="0" dirty="0">
+                <a:solidFill>
+                  <a:srgbClr val="000000"/>
+                </a:solidFill>
+                <a:effectLst/>
+                <a:latin typeface="Arial" panose="020B0604020202020204" pitchFamily="34" charset="0"/>
+                <a:cs typeface="Arial" panose="020B0604020202020204" pitchFamily="34" charset="0"/>
+              </a:rPr>
+              <a:t>., p. 1–16, ago. 2018.</a:t>
+            </a:r>
+          </a:p>
+          <a:p>
+            <a:pPr algn="just"/>
+            <a:r>
+              <a:rPr lang="pt-BR" sz="2600" b="0" i="0" dirty="0">
+                <a:solidFill>
+                  <a:srgbClr val="000000"/>
+                </a:solidFill>
+                <a:effectLst/>
+                <a:latin typeface="Arial" panose="020B0604020202020204" pitchFamily="34" charset="0"/>
+                <a:cs typeface="Arial" panose="020B0604020202020204" pitchFamily="34" charset="0"/>
+              </a:rPr>
+              <a:t>GUERRA, A. J. T. Processos Erosivos nas Encostas. In: Geomorfologia: exercícios, técnicas e aplicações. </a:t>
+            </a:r>
+            <a:r>
+              <a:rPr lang="pt-BR" sz="2600" b="0" i="0" dirty="0" err="1">
+                <a:solidFill>
+                  <a:srgbClr val="000000"/>
+                </a:solidFill>
+                <a:effectLst/>
+                <a:latin typeface="Arial" panose="020B0604020202020204" pitchFamily="34" charset="0"/>
+                <a:cs typeface="Arial" panose="020B0604020202020204" pitchFamily="34" charset="0"/>
+              </a:rPr>
+              <a:t>Orgs</a:t>
+            </a:r>
+            <a:r>
+              <a:rPr lang="pt-BR" sz="2600" b="0" i="0" dirty="0">
+                <a:solidFill>
+                  <a:srgbClr val="000000"/>
+                </a:solidFill>
+                <a:effectLst/>
+                <a:latin typeface="Arial" panose="020B0604020202020204" pitchFamily="34" charset="0"/>
+                <a:cs typeface="Arial" panose="020B0604020202020204" pitchFamily="34" charset="0"/>
+              </a:rPr>
+              <a:t>. Cunha, S. B. &amp; Guerra, A. J. T. Rio de Janeiro, Bertrand Brasil, 1996</a:t>
+            </a:r>
+          </a:p>
+          <a:p>
+            <a:pPr algn="just"/>
+            <a:r>
+              <a:rPr lang="pt-BR" sz="2600" b="0" i="0" dirty="0">
+                <a:solidFill>
+                  <a:srgbClr val="000000"/>
+                </a:solidFill>
+                <a:effectLst/>
+                <a:latin typeface="Arial" panose="020B0604020202020204" pitchFamily="34" charset="0"/>
+                <a:cs typeface="Arial" panose="020B0604020202020204" pitchFamily="34" charset="0"/>
+              </a:rPr>
+              <a:t>LAZZARETTI, </a:t>
+            </a:r>
+            <a:r>
+              <a:rPr lang="pt-BR" sz="2600" b="0" i="0" dirty="0" err="1">
+                <a:solidFill>
+                  <a:srgbClr val="000000"/>
+                </a:solidFill>
+                <a:effectLst/>
+                <a:latin typeface="Arial" panose="020B0604020202020204" pitchFamily="34" charset="0"/>
+                <a:cs typeface="Arial" panose="020B0604020202020204" pitchFamily="34" charset="0"/>
+              </a:rPr>
+              <a:t>Kellen</a:t>
+            </a:r>
+            <a:r>
+              <a:rPr lang="pt-BR" sz="2600" b="0" i="0" dirty="0">
+                <a:solidFill>
+                  <a:srgbClr val="000000"/>
+                </a:solidFill>
+                <a:effectLst/>
+                <a:latin typeface="Arial" panose="020B0604020202020204" pitchFamily="34" charset="0"/>
+                <a:cs typeface="Arial" panose="020B0604020202020204" pitchFamily="34" charset="0"/>
+              </a:rPr>
+              <a:t>; SEHNEM, Simone; BENCKE, Fernando </a:t>
+            </a:r>
+            <a:r>
+              <a:rPr lang="pt-BR" sz="2600" b="0" i="0" dirty="0" err="1">
+                <a:solidFill>
+                  <a:srgbClr val="000000"/>
+                </a:solidFill>
+                <a:effectLst/>
+                <a:latin typeface="Arial" panose="020B0604020202020204" pitchFamily="34" charset="0"/>
+                <a:cs typeface="Arial" panose="020B0604020202020204" pitchFamily="34" charset="0"/>
+              </a:rPr>
+              <a:t>Fantoni</a:t>
+            </a:r>
+            <a:r>
+              <a:rPr lang="pt-BR" sz="2600" b="0" i="0" dirty="0">
+                <a:solidFill>
+                  <a:srgbClr val="000000"/>
+                </a:solidFill>
+                <a:effectLst/>
+                <a:latin typeface="Arial" panose="020B0604020202020204" pitchFamily="34" charset="0"/>
+                <a:cs typeface="Arial" panose="020B0604020202020204" pitchFamily="34" charset="0"/>
+              </a:rPr>
+              <a:t>; MACHADO, </a:t>
+            </a:r>
+            <a:r>
+              <a:rPr lang="pt-BR" sz="2600" b="0" i="0" dirty="0" err="1">
+                <a:solidFill>
+                  <a:srgbClr val="000000"/>
+                </a:solidFill>
+                <a:effectLst/>
+                <a:latin typeface="Arial" panose="020B0604020202020204" pitchFamily="34" charset="0"/>
+                <a:cs typeface="Arial" panose="020B0604020202020204" pitchFamily="34" charset="0"/>
+              </a:rPr>
+              <a:t>Hilka</a:t>
+            </a:r>
+            <a:r>
+              <a:rPr lang="pt-BR" sz="2600" b="0" i="0" dirty="0">
+                <a:solidFill>
+                  <a:srgbClr val="000000"/>
+                </a:solidFill>
+                <a:effectLst/>
+                <a:latin typeface="Arial" panose="020B0604020202020204" pitchFamily="34" charset="0"/>
+                <a:cs typeface="Arial" panose="020B0604020202020204" pitchFamily="34" charset="0"/>
+              </a:rPr>
+              <a:t> </a:t>
+            </a:r>
+            <a:r>
+              <a:rPr lang="pt-BR" sz="2600" b="0" i="0" dirty="0" err="1">
+                <a:solidFill>
+                  <a:srgbClr val="000000"/>
+                </a:solidFill>
+                <a:effectLst/>
+                <a:latin typeface="Arial" panose="020B0604020202020204" pitchFamily="34" charset="0"/>
+                <a:cs typeface="Arial" panose="020B0604020202020204" pitchFamily="34" charset="0"/>
+              </a:rPr>
+              <a:t>Pelizza</a:t>
+            </a:r>
+            <a:r>
+              <a:rPr lang="pt-BR" sz="2600" b="0" i="0" dirty="0">
+                <a:solidFill>
+                  <a:srgbClr val="000000"/>
+                </a:solidFill>
+                <a:effectLst/>
+                <a:latin typeface="Arial" panose="020B0604020202020204" pitchFamily="34" charset="0"/>
+                <a:cs typeface="Arial" panose="020B0604020202020204" pitchFamily="34" charset="0"/>
+              </a:rPr>
+              <a:t>. Cidades inteligentes: insights e contribuições das pesquisas brasileiras, Revista Brasileira de Gestão Urbana, 2019, . DOI https://doi.org/10.1590/2175- 3369.011.e20190118</a:t>
+            </a:r>
+          </a:p>
+          <a:p>
+            <a:pPr algn="just"/>
+            <a:r>
+              <a:rPr lang="pt-BR" sz="2600" b="0" i="0" dirty="0">
+                <a:solidFill>
+                  <a:srgbClr val="000000"/>
+                </a:solidFill>
+                <a:effectLst/>
+                <a:latin typeface="Arial" panose="020B0604020202020204" pitchFamily="34" charset="0"/>
+                <a:cs typeface="Arial" panose="020B0604020202020204" pitchFamily="34" charset="0"/>
+              </a:rPr>
               <a:t>NAM, T.; PARDO, T.A. </a:t>
             </a:r>
             <a:r>
-              <a:rPr lang="pt-BR" sz="2600" b="1" i="0" dirty="0" err="1">
+              <a:rPr lang="pt-BR" sz="2600" b="0" i="0" dirty="0" err="1">
                 <a:solidFill>
                   <a:srgbClr val="000000"/>
                 </a:solidFill>
@@ -5663,7 +6221,7 @@
               <a:t>Conceptualizing</a:t>
             </a:r>
             <a:r>
-              <a:rPr lang="pt-BR" sz="2600" b="1" i="0" dirty="0">
+              <a:rPr lang="pt-BR" sz="2600" b="0" i="0" dirty="0">
                 <a:solidFill>
                   <a:srgbClr val="000000"/>
                 </a:solidFill>
@@ -5674,7 +6232,7 @@
               <a:t> </a:t>
             </a:r>
             <a:r>
-              <a:rPr lang="pt-BR" sz="2600" b="1" i="0" dirty="0" err="1">
+              <a:rPr lang="pt-BR" sz="2600" b="0" i="0" dirty="0" err="1">
                 <a:solidFill>
                   <a:srgbClr val="000000"/>
                 </a:solidFill>
@@ -5685,7 +6243,7 @@
               <a:t>smart</a:t>
             </a:r>
             <a:r>
-              <a:rPr lang="pt-BR" sz="2600" b="1" i="0" dirty="0">
+              <a:rPr lang="pt-BR" sz="2600" b="0" i="0" dirty="0">
                 <a:solidFill>
                   <a:srgbClr val="000000"/>
                 </a:solidFill>
@@ -5696,7 +6254,7 @@
               <a:t> </a:t>
             </a:r>
             <a:r>
-              <a:rPr lang="pt-BR" sz="2600" b="1" i="0" dirty="0" err="1">
+              <a:rPr lang="pt-BR" sz="2600" b="0" i="0" dirty="0" err="1">
                 <a:solidFill>
                   <a:srgbClr val="000000"/>
                 </a:solidFill>
@@ -5707,7 +6265,7 @@
               <a:t>city</a:t>
             </a:r>
             <a:r>
-              <a:rPr lang="pt-BR" sz="2600" b="1" i="0" dirty="0">
+              <a:rPr lang="pt-BR" sz="2600" b="0" i="0" dirty="0">
                 <a:solidFill>
                   <a:srgbClr val="000000"/>
                 </a:solidFill>
@@ -5718,7 +6276,7 @@
               <a:t> </a:t>
             </a:r>
             <a:r>
-              <a:rPr lang="pt-BR" sz="2600" b="1" i="0" dirty="0" err="1">
+              <a:rPr lang="pt-BR" sz="2600" b="0" i="0" dirty="0" err="1">
                 <a:solidFill>
                   <a:srgbClr val="000000"/>
                 </a:solidFill>
@@ -5729,7 +6287,7 @@
               <a:t>with</a:t>
             </a:r>
             <a:r>
-              <a:rPr lang="pt-BR" sz="2600" b="1" i="0" dirty="0">
+              <a:rPr lang="pt-BR" sz="2600" b="0" i="0" dirty="0">
                 <a:solidFill>
                   <a:srgbClr val="000000"/>
                 </a:solidFill>
@@ -5740,7 +6298,7 @@
               <a:t> </a:t>
             </a:r>
             <a:r>
-              <a:rPr lang="pt-BR" sz="2600" b="1" i="0" dirty="0" err="1">
+              <a:rPr lang="pt-BR" sz="2600" b="0" i="0" dirty="0" err="1">
                 <a:solidFill>
                   <a:srgbClr val="000000"/>
                 </a:solidFill>
@@ -5751,7 +6309,7 @@
               <a:t>dimensions</a:t>
             </a:r>
             <a:r>
-              <a:rPr lang="pt-BR" sz="2600" b="1" i="0" dirty="0">
+              <a:rPr lang="pt-BR" sz="2600" b="0" i="0" dirty="0">
                 <a:solidFill>
                   <a:srgbClr val="000000"/>
                 </a:solidFill>
@@ -5762,7 +6320,7 @@
               <a:t> </a:t>
             </a:r>
             <a:r>
-              <a:rPr lang="pt-BR" sz="2600" b="1" i="0" dirty="0" err="1">
+              <a:rPr lang="pt-BR" sz="2600" b="0" i="0" dirty="0" err="1">
                 <a:solidFill>
                   <a:srgbClr val="000000"/>
                 </a:solidFill>
@@ -5773,7 +6331,7 @@
               <a:t>of</a:t>
             </a:r>
             <a:r>
-              <a:rPr lang="pt-BR" sz="2600" b="1" i="0" dirty="0">
+              <a:rPr lang="pt-BR" sz="2600" b="0" i="0" dirty="0">
                 <a:solidFill>
                   <a:srgbClr val="000000"/>
                 </a:solidFill>
@@ -5784,7 +6342,7 @@
               <a:t> </a:t>
             </a:r>
             <a:r>
-              <a:rPr lang="pt-BR" sz="2600" b="1" i="0" dirty="0" err="1">
+              <a:rPr lang="pt-BR" sz="2600" b="0" i="0" dirty="0" err="1">
                 <a:solidFill>
                   <a:srgbClr val="000000"/>
                 </a:solidFill>
@@ -5795,7 +6353,7 @@
               <a:t>technology</a:t>
             </a:r>
             <a:r>
-              <a:rPr lang="pt-BR" sz="2600" b="1" i="0" dirty="0">
+              <a:rPr lang="pt-BR" sz="2600" b="0" i="0" dirty="0">
                 <a:solidFill>
                   <a:srgbClr val="000000"/>
                 </a:solidFill>
@@ -5806,7 +6364,7 @@
               <a:t>, </a:t>
             </a:r>
             <a:r>
-              <a:rPr lang="pt-BR" sz="2600" b="1" i="0" dirty="0" err="1">
+              <a:rPr lang="pt-BR" sz="2600" b="0" i="0" dirty="0" err="1">
                 <a:solidFill>
                   <a:srgbClr val="000000"/>
                 </a:solidFill>
@@ -5817,7 +6375,7 @@
               <a:t>people</a:t>
             </a:r>
             <a:r>
-              <a:rPr lang="pt-BR" sz="2600" b="1" i="0" dirty="0">
+              <a:rPr lang="pt-BR" sz="2600" b="0" i="0" dirty="0">
                 <a:solidFill>
                   <a:srgbClr val="000000"/>
                 </a:solidFill>
@@ -5828,7 +6386,7 @@
               <a:t> </a:t>
             </a:r>
             <a:r>
-              <a:rPr lang="pt-BR" sz="2600" b="1" i="0" dirty="0" err="1">
+              <a:rPr lang="pt-BR" sz="2600" b="0" i="0" dirty="0" err="1">
                 <a:solidFill>
                   <a:srgbClr val="000000"/>
                 </a:solidFill>
@@ -5839,7 +6397,7 @@
               <a:t>and</a:t>
             </a:r>
             <a:r>
-              <a:rPr lang="pt-BR" sz="2600" b="1" i="0" dirty="0">
+              <a:rPr lang="pt-BR" sz="2600" b="0" i="0" dirty="0">
                 <a:solidFill>
                   <a:srgbClr val="000000"/>
                 </a:solidFill>
@@ -5850,7 +6408,7 @@
               <a:t> </a:t>
             </a:r>
             <a:r>
-              <a:rPr lang="pt-BR" sz="2600" b="1" i="0" dirty="0" err="1">
+              <a:rPr lang="pt-BR" sz="2600" b="0" i="0" dirty="0" err="1">
                 <a:solidFill>
                   <a:srgbClr val="000000"/>
                 </a:solidFill>
@@ -5874,14 +6432,39 @@
           </a:p>
           <a:p>
             <a:pPr algn="just"/>
-            <a:endParaRPr lang="pt-BR" sz="2600" b="0" i="0" dirty="0">
-              <a:solidFill>
-                <a:srgbClr val="000000"/>
-              </a:solidFill>
-              <a:effectLst/>
-              <a:latin typeface="Arial" panose="020B0604020202020204" pitchFamily="34" charset="0"/>
-              <a:cs typeface="Arial" panose="020B0604020202020204" pitchFamily="34" charset="0"/>
-            </a:endParaRPr>
+            <a:r>
+              <a:rPr lang="pt-BR" sz="2600" b="0" i="0" dirty="0">
+                <a:solidFill>
+                  <a:srgbClr val="000000"/>
+                </a:solidFill>
+                <a:effectLst/>
+                <a:latin typeface="Arial" panose="020B0604020202020204" pitchFamily="34" charset="0"/>
+                <a:cs typeface="Arial" panose="020B0604020202020204" pitchFamily="34" charset="0"/>
+              </a:rPr>
+              <a:t>PORTO, Monica, F. A.; PORTO, Rubem La </a:t>
+            </a:r>
+            <a:r>
+              <a:rPr lang="pt-BR" sz="2600" b="0" i="0" dirty="0" err="1">
+                <a:solidFill>
+                  <a:srgbClr val="000000"/>
+                </a:solidFill>
+                <a:effectLst/>
+                <a:latin typeface="Arial" panose="020B0604020202020204" pitchFamily="34" charset="0"/>
+                <a:cs typeface="Arial" panose="020B0604020202020204" pitchFamily="34" charset="0"/>
+              </a:rPr>
+              <a:t>Laina</a:t>
+            </a:r>
+            <a:r>
+              <a:rPr lang="pt-BR" sz="2600" b="0" i="0" dirty="0">
+                <a:solidFill>
+                  <a:srgbClr val="000000"/>
+                </a:solidFill>
+                <a:effectLst/>
+                <a:latin typeface="Arial" panose="020B0604020202020204" pitchFamily="34" charset="0"/>
+                <a:cs typeface="Arial" panose="020B0604020202020204" pitchFamily="34" charset="0"/>
+              </a:rPr>
+              <a:t>, Gestão de bacias hidrográficas, Estudos Avançados, v. 22, n. 63, 2008</a:t>
+            </a:r>
           </a:p>
           <a:p>
             <a:pPr algn="just"/>
@@ -5894,6 +6477,144 @@
                 <a:latin typeface="Arial" panose="020B0604020202020204" pitchFamily="34" charset="0"/>
                 <a:cs typeface="Arial" panose="020B0604020202020204" pitchFamily="34" charset="0"/>
               </a:rPr>
+              <a:t>SAMPIERI, Roberto Hernandez; COLLADO, Carlos </a:t>
+            </a:r>
+            <a:r>
+              <a:rPr lang="pt-BR" sz="2600" b="0" i="0" dirty="0" err="1">
+                <a:solidFill>
+                  <a:srgbClr val="000000"/>
+                </a:solidFill>
+                <a:effectLst/>
+                <a:latin typeface="Arial" panose="020B0604020202020204" pitchFamily="34" charset="0"/>
+                <a:cs typeface="Arial" panose="020B0604020202020204" pitchFamily="34" charset="0"/>
+              </a:rPr>
+              <a:t>Fernadez</a:t>
+            </a:r>
+            <a:r>
+              <a:rPr lang="pt-BR" sz="2600" b="0" i="0" dirty="0">
+                <a:solidFill>
+                  <a:srgbClr val="000000"/>
+                </a:solidFill>
+                <a:effectLst/>
+                <a:latin typeface="Arial" panose="020B0604020202020204" pitchFamily="34" charset="0"/>
+                <a:cs typeface="Arial" panose="020B0604020202020204" pitchFamily="34" charset="0"/>
+              </a:rPr>
+              <a:t>; LUCIO, Pilar Batista </a:t>
+            </a:r>
+            <a:r>
+              <a:rPr lang="pt-BR" sz="2600" b="0" i="0" dirty="0" err="1">
+                <a:solidFill>
+                  <a:srgbClr val="000000"/>
+                </a:solidFill>
+                <a:effectLst/>
+                <a:latin typeface="Arial" panose="020B0604020202020204" pitchFamily="34" charset="0"/>
+                <a:cs typeface="Arial" panose="020B0604020202020204" pitchFamily="34" charset="0"/>
+              </a:rPr>
+              <a:t>Otros</a:t>
+            </a:r>
+            <a:r>
+              <a:rPr lang="pt-BR" sz="2600" b="0" i="0" dirty="0">
+                <a:solidFill>
+                  <a:srgbClr val="000000"/>
+                </a:solidFill>
+                <a:effectLst/>
+                <a:latin typeface="Arial" panose="020B0604020202020204" pitchFamily="34" charset="0"/>
+                <a:cs typeface="Arial" panose="020B0604020202020204" pitchFamily="34" charset="0"/>
+              </a:rPr>
+              <a:t> </a:t>
+            </a:r>
+            <a:r>
+              <a:rPr lang="pt-BR" sz="2600" b="0" i="0" dirty="0" err="1">
+                <a:solidFill>
+                  <a:srgbClr val="000000"/>
+                </a:solidFill>
+                <a:effectLst/>
+                <a:latin typeface="Arial" panose="020B0604020202020204" pitchFamily="34" charset="0"/>
+                <a:cs typeface="Arial" panose="020B0604020202020204" pitchFamily="34" charset="0"/>
+              </a:rPr>
+              <a:t>Metodología</a:t>
+            </a:r>
+            <a:r>
+              <a:rPr lang="pt-BR" sz="2600" b="0" i="0" dirty="0">
+                <a:solidFill>
+                  <a:srgbClr val="000000"/>
+                </a:solidFill>
+                <a:effectLst/>
+                <a:latin typeface="Arial" panose="020B0604020202020204" pitchFamily="34" charset="0"/>
+                <a:cs typeface="Arial" panose="020B0604020202020204" pitchFamily="34" charset="0"/>
+              </a:rPr>
+              <a:t> de </a:t>
+            </a:r>
+            <a:r>
+              <a:rPr lang="pt-BR" sz="2600" b="0" i="0" dirty="0" err="1">
+                <a:solidFill>
+                  <a:srgbClr val="000000"/>
+                </a:solidFill>
+                <a:effectLst/>
+                <a:latin typeface="Arial" panose="020B0604020202020204" pitchFamily="34" charset="0"/>
+                <a:cs typeface="Arial" panose="020B0604020202020204" pitchFamily="34" charset="0"/>
+              </a:rPr>
+              <a:t>la</a:t>
+            </a:r>
+            <a:r>
+              <a:rPr lang="pt-BR" sz="2600" b="0" i="0" dirty="0">
+                <a:solidFill>
+                  <a:srgbClr val="000000"/>
+                </a:solidFill>
+                <a:effectLst/>
+                <a:latin typeface="Arial" panose="020B0604020202020204" pitchFamily="34" charset="0"/>
+                <a:cs typeface="Arial" panose="020B0604020202020204" pitchFamily="34" charset="0"/>
+              </a:rPr>
+              <a:t> </a:t>
+            </a:r>
+            <a:r>
+              <a:rPr lang="pt-BR" sz="2600" b="0" i="0" dirty="0" err="1">
+                <a:solidFill>
+                  <a:srgbClr val="000000"/>
+                </a:solidFill>
+                <a:effectLst/>
+                <a:latin typeface="Arial" panose="020B0604020202020204" pitchFamily="34" charset="0"/>
+                <a:cs typeface="Arial" panose="020B0604020202020204" pitchFamily="34" charset="0"/>
+              </a:rPr>
+              <a:t>Investigación</a:t>
+            </a:r>
+            <a:r>
+              <a:rPr lang="pt-BR" sz="2600" b="0" i="0" dirty="0">
+                <a:solidFill>
+                  <a:srgbClr val="000000"/>
+                </a:solidFill>
+                <a:effectLst/>
+                <a:latin typeface="Arial" panose="020B0604020202020204" pitchFamily="34" charset="0"/>
+                <a:cs typeface="Arial" panose="020B0604020202020204" pitchFamily="34" charset="0"/>
+              </a:rPr>
+              <a:t>, v. 3, 1991.</a:t>
+            </a:r>
+          </a:p>
+          <a:p>
+            <a:pPr algn="just"/>
+            <a:r>
+              <a:rPr lang="pt-BR" sz="2600" b="0" i="0" dirty="0">
+                <a:solidFill>
+                  <a:srgbClr val="000000"/>
+                </a:solidFill>
+                <a:effectLst/>
+                <a:latin typeface="Arial" panose="020B0604020202020204" pitchFamily="34" charset="0"/>
+                <a:cs typeface="Arial" panose="020B0604020202020204" pitchFamily="34" charset="0"/>
+              </a:rPr>
+              <a:t>SILVEIRA, D. T.; CÓDOVA, F. P. A pesquisa científica. In: GERHARDDT, T. E. e SILVEIRA, D. T. (org.). Métodos de Pesquisa. Porto Alegre: Editora de UFRGS, P. 31-42, 2009.</a:t>
+            </a:r>
+          </a:p>
+          <a:p>
+            <a:pPr algn="just"/>
+            <a:r>
+              <a:rPr lang="pt-BR" sz="2600" b="0" i="0" dirty="0">
+                <a:solidFill>
+                  <a:srgbClr val="000000"/>
+                </a:solidFill>
+                <a:effectLst/>
+                <a:latin typeface="Arial" panose="020B0604020202020204" pitchFamily="34" charset="0"/>
+                <a:cs typeface="Arial" panose="020B0604020202020204" pitchFamily="34" charset="0"/>
+              </a:rPr>
               <a:t>TOPPETA, D. The </a:t>
             </a:r>
             <a:r>
@@ -6184,20 +6905,6 @@
             </a:r>
           </a:p>
           <a:p>
-            <a:pPr marL="457200" indent="-457200" algn="just">
-              <a:buFontTx/>
-              <a:buChar char="-"/>
-            </a:pPr>
-            <a:endParaRPr lang="pt-BR" sz="2600" b="0" i="0" dirty="0">
-              <a:solidFill>
-                <a:srgbClr val="000000"/>
-              </a:solidFill>
-              <a:effectLst/>
-              <a:latin typeface="Arial" panose="020B0604020202020204" pitchFamily="34" charset="0"/>
-              <a:cs typeface="Arial" panose="020B0604020202020204" pitchFamily="34" charset="0"/>
-            </a:endParaRPr>
-          </a:p>
-          <a:p>
             <a:pPr algn="just"/>
             <a:r>
               <a:rPr lang="pt-BR" sz="2600" b="0" i="0" dirty="0">
@@ -6408,418 +7115,6 @@
               </a:rPr>
               <a:t>, n. 81, p. 145–160., 2018.</a:t>
             </a:r>
-          </a:p>
-          <a:p>
-            <a:pPr algn="just"/>
-            <a:endParaRPr lang="pt-BR" sz="2600" dirty="0">
-              <a:solidFill>
-                <a:srgbClr val="000000"/>
-              </a:solidFill>
-              <a:latin typeface="Arial" panose="020B0604020202020204" pitchFamily="34" charset="0"/>
-              <a:cs typeface="Arial" panose="020B0604020202020204" pitchFamily="34" charset="0"/>
-            </a:endParaRPr>
-          </a:p>
-          <a:p>
-            <a:pPr algn="just"/>
-            <a:r>
-              <a:rPr lang="pt-BR" sz="2600" b="0" i="0" dirty="0">
-                <a:solidFill>
-                  <a:srgbClr val="000000"/>
-                </a:solidFill>
-                <a:effectLst/>
-                <a:latin typeface="Arial" panose="020B0604020202020204" pitchFamily="34" charset="0"/>
-                <a:cs typeface="Arial" panose="020B0604020202020204" pitchFamily="34" charset="0"/>
-              </a:rPr>
-              <a:t>GLEICK, P.; ICELAND, C. </a:t>
-            </a:r>
-            <a:r>
-              <a:rPr lang="pt-BR" sz="2600" b="0" i="0" dirty="0" err="1">
-                <a:solidFill>
-                  <a:srgbClr val="000000"/>
-                </a:solidFill>
-                <a:effectLst/>
-                <a:latin typeface="Arial" panose="020B0604020202020204" pitchFamily="34" charset="0"/>
-                <a:cs typeface="Arial" panose="020B0604020202020204" pitchFamily="34" charset="0"/>
-              </a:rPr>
-              <a:t>Water</a:t>
-            </a:r>
-            <a:r>
-              <a:rPr lang="pt-BR" sz="2600" b="0" i="0" dirty="0">
-                <a:solidFill>
-                  <a:srgbClr val="000000"/>
-                </a:solidFill>
-                <a:effectLst/>
-                <a:latin typeface="Arial" panose="020B0604020202020204" pitchFamily="34" charset="0"/>
-                <a:cs typeface="Arial" panose="020B0604020202020204" pitchFamily="34" charset="0"/>
-              </a:rPr>
-              <a:t>, Security, </a:t>
-            </a:r>
-            <a:r>
-              <a:rPr lang="pt-BR" sz="2600" b="0" i="0" dirty="0" err="1">
-                <a:solidFill>
-                  <a:srgbClr val="000000"/>
-                </a:solidFill>
-                <a:effectLst/>
-                <a:latin typeface="Arial" panose="020B0604020202020204" pitchFamily="34" charset="0"/>
-                <a:cs typeface="Arial" panose="020B0604020202020204" pitchFamily="34" charset="0"/>
-              </a:rPr>
-              <a:t>and</a:t>
-            </a:r>
-            <a:r>
-              <a:rPr lang="pt-BR" sz="2600" b="0" i="0" dirty="0">
-                <a:solidFill>
-                  <a:srgbClr val="000000"/>
-                </a:solidFill>
-                <a:effectLst/>
-                <a:latin typeface="Arial" panose="020B0604020202020204" pitchFamily="34" charset="0"/>
-                <a:cs typeface="Arial" panose="020B0604020202020204" pitchFamily="34" charset="0"/>
-              </a:rPr>
-              <a:t> </a:t>
-            </a:r>
-            <a:r>
-              <a:rPr lang="pt-BR" sz="2600" b="0" i="0" dirty="0" err="1">
-                <a:solidFill>
-                  <a:srgbClr val="000000"/>
-                </a:solidFill>
-                <a:effectLst/>
-                <a:latin typeface="Arial" panose="020B0604020202020204" pitchFamily="34" charset="0"/>
-                <a:cs typeface="Arial" panose="020B0604020202020204" pitchFamily="34" charset="0"/>
-              </a:rPr>
-              <a:t>Conflict</a:t>
-            </a:r>
-            <a:r>
-              <a:rPr lang="pt-BR" sz="2600" b="0" i="0" dirty="0">
-                <a:solidFill>
-                  <a:srgbClr val="000000"/>
-                </a:solidFill>
-                <a:effectLst/>
-                <a:latin typeface="Arial" panose="020B0604020202020204" pitchFamily="34" charset="0"/>
-                <a:cs typeface="Arial" panose="020B0604020202020204" pitchFamily="34" charset="0"/>
-              </a:rPr>
-              <a:t>. </a:t>
-            </a:r>
-            <a:r>
-              <a:rPr lang="pt-BR" sz="2600" b="0" i="0" dirty="0" err="1">
-                <a:solidFill>
-                  <a:srgbClr val="000000"/>
-                </a:solidFill>
-                <a:effectLst/>
-                <a:latin typeface="Arial" panose="020B0604020202020204" pitchFamily="34" charset="0"/>
-                <a:cs typeface="Arial" panose="020B0604020202020204" pitchFamily="34" charset="0"/>
-              </a:rPr>
-              <a:t>Issue</a:t>
-            </a:r>
-            <a:r>
-              <a:rPr lang="pt-BR" sz="2600" b="0" i="0" dirty="0">
-                <a:solidFill>
-                  <a:srgbClr val="000000"/>
-                </a:solidFill>
-                <a:effectLst/>
-                <a:latin typeface="Arial" panose="020B0604020202020204" pitchFamily="34" charset="0"/>
-                <a:cs typeface="Arial" panose="020B0604020202020204" pitchFamily="34" charset="0"/>
-              </a:rPr>
-              <a:t> </a:t>
-            </a:r>
-            <a:r>
-              <a:rPr lang="pt-BR" sz="2600" b="0" i="0" dirty="0" err="1">
-                <a:solidFill>
-                  <a:srgbClr val="000000"/>
-                </a:solidFill>
-                <a:effectLst/>
-                <a:latin typeface="Arial" panose="020B0604020202020204" pitchFamily="34" charset="0"/>
-                <a:cs typeface="Arial" panose="020B0604020202020204" pitchFamily="34" charset="0"/>
-              </a:rPr>
-              <a:t>Brief</a:t>
-            </a:r>
-            <a:r>
-              <a:rPr lang="pt-BR" sz="2600" b="0" i="0" dirty="0">
-                <a:solidFill>
-                  <a:srgbClr val="000000"/>
-                </a:solidFill>
-                <a:effectLst/>
-                <a:latin typeface="Arial" panose="020B0604020202020204" pitchFamily="34" charset="0"/>
-                <a:cs typeface="Arial" panose="020B0604020202020204" pitchFamily="34" charset="0"/>
-              </a:rPr>
-              <a:t>. World </a:t>
-            </a:r>
-            <a:r>
-              <a:rPr lang="pt-BR" sz="2600" b="0" i="0" dirty="0" err="1">
-                <a:solidFill>
-                  <a:srgbClr val="000000"/>
-                </a:solidFill>
-                <a:effectLst/>
-                <a:latin typeface="Arial" panose="020B0604020202020204" pitchFamily="34" charset="0"/>
-                <a:cs typeface="Arial" panose="020B0604020202020204" pitchFamily="34" charset="0"/>
-              </a:rPr>
-              <a:t>Resource</a:t>
-            </a:r>
-            <a:r>
-              <a:rPr lang="pt-BR" sz="2600" b="0" i="0" dirty="0">
-                <a:solidFill>
-                  <a:srgbClr val="000000"/>
-                </a:solidFill>
-                <a:effectLst/>
-                <a:latin typeface="Arial" panose="020B0604020202020204" pitchFamily="34" charset="0"/>
-                <a:cs typeface="Arial" panose="020B0604020202020204" pitchFamily="34" charset="0"/>
-              </a:rPr>
-              <a:t> </a:t>
-            </a:r>
-            <a:r>
-              <a:rPr lang="pt-BR" sz="2600" b="0" i="0" dirty="0" err="1">
-                <a:solidFill>
-                  <a:srgbClr val="000000"/>
-                </a:solidFill>
-                <a:effectLst/>
-                <a:latin typeface="Arial" panose="020B0604020202020204" pitchFamily="34" charset="0"/>
-                <a:cs typeface="Arial" panose="020B0604020202020204" pitchFamily="34" charset="0"/>
-              </a:rPr>
-              <a:t>Institute</a:t>
-            </a:r>
-            <a:r>
-              <a:rPr lang="pt-BR" sz="2600" b="0" i="0" dirty="0">
-                <a:solidFill>
-                  <a:srgbClr val="000000"/>
-                </a:solidFill>
-                <a:effectLst/>
-                <a:latin typeface="Arial" panose="020B0604020202020204" pitchFamily="34" charset="0"/>
-                <a:cs typeface="Arial" panose="020B0604020202020204" pitchFamily="34" charset="0"/>
-              </a:rPr>
-              <a:t> </a:t>
-            </a:r>
-            <a:r>
-              <a:rPr lang="pt-BR" sz="2600" b="0" i="0" dirty="0" err="1">
-                <a:solidFill>
-                  <a:srgbClr val="000000"/>
-                </a:solidFill>
-                <a:effectLst/>
-                <a:latin typeface="Arial" panose="020B0604020202020204" pitchFamily="34" charset="0"/>
-                <a:cs typeface="Arial" panose="020B0604020202020204" pitchFamily="34" charset="0"/>
-              </a:rPr>
-              <a:t>and</a:t>
-            </a:r>
-            <a:r>
-              <a:rPr lang="pt-BR" sz="2600" b="0" i="0" dirty="0">
-                <a:solidFill>
-                  <a:srgbClr val="000000"/>
-                </a:solidFill>
-                <a:effectLst/>
-                <a:latin typeface="Arial" panose="020B0604020202020204" pitchFamily="34" charset="0"/>
-                <a:cs typeface="Arial" panose="020B0604020202020204" pitchFamily="34" charset="0"/>
-              </a:rPr>
-              <a:t> Pacific </a:t>
-            </a:r>
-            <a:r>
-              <a:rPr lang="pt-BR" sz="2600" b="0" i="0" dirty="0" err="1">
-                <a:solidFill>
-                  <a:srgbClr val="000000"/>
-                </a:solidFill>
-                <a:effectLst/>
-                <a:latin typeface="Arial" panose="020B0604020202020204" pitchFamily="34" charset="0"/>
-                <a:cs typeface="Arial" panose="020B0604020202020204" pitchFamily="34" charset="0"/>
-              </a:rPr>
-              <a:t>Institute</a:t>
-            </a:r>
-            <a:r>
-              <a:rPr lang="pt-BR" sz="2600" b="0" i="0" dirty="0">
-                <a:solidFill>
-                  <a:srgbClr val="000000"/>
-                </a:solidFill>
-                <a:effectLst/>
-                <a:latin typeface="Arial" panose="020B0604020202020204" pitchFamily="34" charset="0"/>
-                <a:cs typeface="Arial" panose="020B0604020202020204" pitchFamily="34" charset="0"/>
-              </a:rPr>
-              <a:t>., p. 1–16, ago. 2018.</a:t>
-            </a:r>
-          </a:p>
-          <a:p>
-            <a:pPr algn="just"/>
-            <a:endParaRPr lang="pt-BR" sz="2600" dirty="0">
-              <a:solidFill>
-                <a:srgbClr val="000000"/>
-              </a:solidFill>
-              <a:latin typeface="Arial" panose="020B0604020202020204" pitchFamily="34" charset="0"/>
-              <a:cs typeface="Arial" panose="020B0604020202020204" pitchFamily="34" charset="0"/>
-            </a:endParaRPr>
-          </a:p>
-          <a:p>
-            <a:pPr algn="just"/>
-            <a:r>
-              <a:rPr lang="pt-BR" sz="2600" b="0" i="0" dirty="0">
-                <a:solidFill>
-                  <a:srgbClr val="000000"/>
-                </a:solidFill>
-                <a:effectLst/>
-                <a:latin typeface="Arial" panose="020B0604020202020204" pitchFamily="34" charset="0"/>
-                <a:cs typeface="Arial" panose="020B0604020202020204" pitchFamily="34" charset="0"/>
-              </a:rPr>
-              <a:t>BORSATO, F.; MARTONI, A. M., Estudo da fisiografia das bacias hidrográficas urbanas no Município de Maringá, Estado do Paraná, Acta </a:t>
-            </a:r>
-            <a:r>
-              <a:rPr lang="pt-BR" sz="2600" b="0" i="0" dirty="0" err="1">
-                <a:solidFill>
-                  <a:srgbClr val="000000"/>
-                </a:solidFill>
-                <a:effectLst/>
-                <a:latin typeface="Arial" panose="020B0604020202020204" pitchFamily="34" charset="0"/>
-                <a:cs typeface="Arial" panose="020B0604020202020204" pitchFamily="34" charset="0"/>
-              </a:rPr>
-              <a:t>Scientiarum</a:t>
-            </a:r>
-            <a:r>
-              <a:rPr lang="pt-BR" sz="2600" b="0" i="0" dirty="0">
-                <a:solidFill>
-                  <a:srgbClr val="000000"/>
-                </a:solidFill>
-                <a:effectLst/>
-                <a:latin typeface="Arial" panose="020B0604020202020204" pitchFamily="34" charset="0"/>
-                <a:cs typeface="Arial" panose="020B0604020202020204" pitchFamily="34" charset="0"/>
-              </a:rPr>
-              <a:t> </a:t>
-            </a:r>
-            <a:r>
-              <a:rPr lang="pt-BR" sz="2600" b="0" i="0" dirty="0" err="1">
-                <a:solidFill>
-                  <a:srgbClr val="000000"/>
-                </a:solidFill>
-                <a:effectLst/>
-                <a:latin typeface="Arial" panose="020B0604020202020204" pitchFamily="34" charset="0"/>
-                <a:cs typeface="Arial" panose="020B0604020202020204" pitchFamily="34" charset="0"/>
-              </a:rPr>
-              <a:t>Human</a:t>
-            </a:r>
-            <a:r>
-              <a:rPr lang="pt-BR" sz="2600" b="0" i="0" dirty="0">
-                <a:solidFill>
-                  <a:srgbClr val="000000"/>
-                </a:solidFill>
-                <a:effectLst/>
-                <a:latin typeface="Arial" panose="020B0604020202020204" pitchFamily="34" charset="0"/>
-                <a:cs typeface="Arial" panose="020B0604020202020204" pitchFamily="34" charset="0"/>
-              </a:rPr>
-              <a:t> </a:t>
-            </a:r>
-            <a:r>
-              <a:rPr lang="pt-BR" sz="2600" b="0" i="0" dirty="0" err="1">
-                <a:solidFill>
-                  <a:srgbClr val="000000"/>
-                </a:solidFill>
-                <a:effectLst/>
-                <a:latin typeface="Arial" panose="020B0604020202020204" pitchFamily="34" charset="0"/>
-                <a:cs typeface="Arial" panose="020B0604020202020204" pitchFamily="34" charset="0"/>
-              </a:rPr>
-              <a:t>and</a:t>
-            </a:r>
-            <a:r>
-              <a:rPr lang="pt-BR" sz="2600" b="0" i="0" dirty="0">
-                <a:solidFill>
-                  <a:srgbClr val="000000"/>
-                </a:solidFill>
-                <a:effectLst/>
-                <a:latin typeface="Arial" panose="020B0604020202020204" pitchFamily="34" charset="0"/>
-                <a:cs typeface="Arial" panose="020B0604020202020204" pitchFamily="34" charset="0"/>
-              </a:rPr>
-              <a:t> Social Science, 2008, DOI: 10.4025/actascihumansoc.v26i2.1391</a:t>
-            </a:r>
-          </a:p>
-          <a:p>
-            <a:pPr algn="just"/>
-            <a:endParaRPr lang="pt-BR" sz="2600" dirty="0">
-              <a:solidFill>
-                <a:srgbClr val="000000"/>
-              </a:solidFill>
-              <a:latin typeface="Arial" panose="020B0604020202020204" pitchFamily="34" charset="0"/>
-              <a:cs typeface="Arial" panose="020B0604020202020204" pitchFamily="34" charset="0"/>
-            </a:endParaRPr>
-          </a:p>
-          <a:p>
-            <a:pPr algn="just"/>
-            <a:r>
-              <a:rPr lang="pt-BR" sz="2600" b="0" i="0" dirty="0">
-                <a:solidFill>
-                  <a:srgbClr val="000000"/>
-                </a:solidFill>
-                <a:effectLst/>
-                <a:latin typeface="Arial" panose="020B0604020202020204" pitchFamily="34" charset="0"/>
-                <a:cs typeface="Arial" panose="020B0604020202020204" pitchFamily="34" charset="0"/>
-              </a:rPr>
-              <a:t>GUERRA, A. J. T. Processos Erosivos nas Encostas. In: Geomorfologia: exercícios, técnicas e aplicações. </a:t>
-            </a:r>
-            <a:r>
-              <a:rPr lang="pt-BR" sz="2600" b="0" i="0" dirty="0" err="1">
-                <a:solidFill>
-                  <a:srgbClr val="000000"/>
-                </a:solidFill>
-                <a:effectLst/>
-                <a:latin typeface="Arial" panose="020B0604020202020204" pitchFamily="34" charset="0"/>
-                <a:cs typeface="Arial" panose="020B0604020202020204" pitchFamily="34" charset="0"/>
-              </a:rPr>
-              <a:t>Orgs</a:t>
-            </a:r>
-            <a:r>
-              <a:rPr lang="pt-BR" sz="2600" b="0" i="0" dirty="0">
-                <a:solidFill>
-                  <a:srgbClr val="000000"/>
-                </a:solidFill>
-                <a:effectLst/>
-                <a:latin typeface="Arial" panose="020B0604020202020204" pitchFamily="34" charset="0"/>
-                <a:cs typeface="Arial" panose="020B0604020202020204" pitchFamily="34" charset="0"/>
-              </a:rPr>
-              <a:t>. Cunha, S. B. &amp; Guerra, A. J. T. Rio de Janeiro, Bertrand Brasil, 1996</a:t>
-            </a:r>
-          </a:p>
-          <a:p>
-            <a:pPr algn="just"/>
-            <a:endParaRPr lang="pt-BR" sz="2600" b="0" i="0" dirty="0">
-              <a:solidFill>
-                <a:srgbClr val="000000"/>
-              </a:solidFill>
-              <a:effectLst/>
-              <a:latin typeface="Arial" panose="020B0604020202020204" pitchFamily="34" charset="0"/>
-              <a:cs typeface="Arial" panose="020B0604020202020204" pitchFamily="34" charset="0"/>
-            </a:endParaRPr>
-          </a:p>
-          <a:p>
-            <a:pPr algn="just"/>
-            <a:r>
-              <a:rPr lang="pt-BR" sz="2600" b="0" i="0" dirty="0">
-                <a:solidFill>
-                  <a:srgbClr val="000000"/>
-                </a:solidFill>
-                <a:effectLst/>
-                <a:latin typeface="Arial" panose="020B0604020202020204" pitchFamily="34" charset="0"/>
-                <a:cs typeface="Arial" panose="020B0604020202020204" pitchFamily="34" charset="0"/>
-              </a:rPr>
-              <a:t>PORTO, Monica, F. A.; PORTO, Rubem La </a:t>
-            </a:r>
-            <a:r>
-              <a:rPr lang="pt-BR" sz="2600" b="0" i="0" dirty="0" err="1">
-                <a:solidFill>
-                  <a:srgbClr val="000000"/>
-                </a:solidFill>
-                <a:effectLst/>
-                <a:latin typeface="Arial" panose="020B0604020202020204" pitchFamily="34" charset="0"/>
-                <a:cs typeface="Arial" panose="020B0604020202020204" pitchFamily="34" charset="0"/>
-              </a:rPr>
-              <a:t>Laina</a:t>
-            </a:r>
-            <a:r>
-              <a:rPr lang="pt-BR" sz="2600" b="0" i="0" dirty="0">
-                <a:solidFill>
-                  <a:srgbClr val="000000"/>
-                </a:solidFill>
-                <a:effectLst/>
-                <a:latin typeface="Arial" panose="020B0604020202020204" pitchFamily="34" charset="0"/>
-                <a:cs typeface="Arial" panose="020B0604020202020204" pitchFamily="34" charset="0"/>
-              </a:rPr>
-              <a:t>, Gestão de bacias hidrográficas, Estudos Avançados, v. 22, n. 63, 2008</a:t>
-            </a:r>
-            <a:endParaRPr lang="pt-BR" sz="2800" b="0" i="0" dirty="0">
-              <a:solidFill>
-                <a:srgbClr val="000000"/>
-              </a:solidFill>
-              <a:effectLst/>
-              <a:latin typeface="Times New Roman" panose="02020603050405020304" pitchFamily="18" charset="0"/>
-            </a:endParaRPr>
           </a:p>
         </p:txBody>
       </p:sp>
@@ -6837,8 +7132,8 @@
         </p:nvSpPr>
         <p:spPr>
           <a:xfrm>
-            <a:off x="16834338" y="9885668"/>
-            <a:ext cx="14338720" cy="2862322"/>
+            <a:off x="16876362" y="8244660"/>
+            <a:ext cx="14338720" cy="3416320"/>
           </a:xfrm>
           <a:prstGeom prst="rect">
             <a:avLst/>
@@ -6956,10 +7251,30 @@
             <a:r>
               <a:rPr lang="pt-BR" sz="3600" dirty="0">
                 <a:effectLst/>
-              </a:rPr>
-              <a:t>que os conceitos e aplicações sobre cidades inteligentes que utilizam TIC não poderiam ser úteis e adaptáveis no contexto de uma bacia hidrográfica para auxiliar na gestão de recursos hídricos em uma bacia hidrográfica? Seria possível a partir deste estudo criar o conceito de bacias hidrográficas inteligentes?</a:t>
-            </a:r>
-            <a:endParaRPr lang="pt-BR" sz="3600" dirty="0"/>
+                <a:latin typeface="Arial" panose="020B0604020202020204" pitchFamily="34" charset="0"/>
+                <a:cs typeface="Arial" panose="020B0604020202020204" pitchFamily="34" charset="0"/>
+              </a:rPr>
+              <a:t>respostas da natureza.</a:t>
+            </a:r>
+            <a:r>
+              <a:rPr lang="pt-BR" sz="3600" dirty="0">
+                <a:latin typeface="Arial" panose="020B0604020202020204" pitchFamily="34" charset="0"/>
+                <a:cs typeface="Arial" panose="020B0604020202020204" pitchFamily="34" charset="0"/>
+              </a:rPr>
+              <a:t> </a:t>
+            </a:r>
+            <a:r>
+              <a:rPr lang="pt-BR" sz="3600" dirty="0">
+                <a:effectLst/>
+                <a:latin typeface="Arial" panose="020B0604020202020204" pitchFamily="34" charset="0"/>
+                <a:cs typeface="Arial" panose="020B0604020202020204" pitchFamily="34" charset="0"/>
+              </a:rPr>
+              <a:t>Assim, diante  da  complexidade desta  temática,  será que os conceitos e aplicações sobre cidades inteligentes que utilizam TIC não poderiam ser úteis e adaptáveis no contexto de uma bacia hidrográfica para auxiliar na gestão de recursos hídricos em uma bacia hidrográfica? Seria possível a partir deste estudo criar o conceito de bacias hidrográficas inteligentes?</a:t>
+            </a:r>
+            <a:endParaRPr lang="pt-BR" sz="3600" dirty="0">
+              <a:latin typeface="Arial" panose="020B0604020202020204" pitchFamily="34" charset="0"/>
+              <a:cs typeface="Arial" panose="020B0604020202020204" pitchFamily="34" charset="0"/>
+            </a:endParaRPr>
           </a:p>
         </p:txBody>
       </p:sp>
@@ -6971,8 +7286,8 @@
         </p:nvSpPr>
         <p:spPr>
           <a:xfrm>
-            <a:off x="1259287" y="7417199"/>
-            <a:ext cx="30479242" cy="2057807"/>
+            <a:off x="886922" y="5502471"/>
+            <a:ext cx="30625443" cy="2599941"/>
           </a:xfrm>
           <a:prstGeom prst="rect">
             <a:avLst/>
@@ -6989,10 +7304,7 @@
           </a:bodyPr>
           <a:lstStyle/>
           <a:p>
-            <a:pPr>
-              <a:lnSpc>
-                <a:spcPct val="107000"/>
-              </a:lnSpc>
+            <a:pPr algn="just">
               <a:spcAft>
                 <a:spcPts val="800"/>
               </a:spcAft>
@@ -7002,36 +7314,10 @@
                 <a:solidFill>
                   <a:srgbClr val="295872"/>
                 </a:solidFill>
-                <a:effectLst/>
-                <a:latin typeface="Arial" panose="020B0604020202020204" pitchFamily="34" charset="0"/>
-                <a:ea typeface="Calibri" panose="020F0502020204030204" pitchFamily="34" charset="0"/>
+                <a:latin typeface="Arial" panose="020B0604020202020204" pitchFamily="34" charset="0"/>
                 <a:cs typeface="Times New Roman" panose="02020603050405020304" pitchFamily="18" charset="0"/>
               </a:rPr>
-              <a:t>INTERNET DAS COISAS (</a:t>
-            </a:r>
-            <a:r>
-              <a:rPr lang="pt-BR" sz="6000" b="1" dirty="0" err="1">
-                <a:solidFill>
-                  <a:srgbClr val="295872"/>
-                </a:solidFill>
-                <a:effectLst/>
-                <a:latin typeface="Arial" panose="020B0604020202020204" pitchFamily="34" charset="0"/>
-                <a:ea typeface="Calibri" panose="020F0502020204030204" pitchFamily="34" charset="0"/>
-                <a:cs typeface="Times New Roman" panose="02020603050405020304" pitchFamily="18" charset="0"/>
-              </a:rPr>
-              <a:t>IoT</a:t>
-            </a:r>
-            <a:r>
-              <a:rPr lang="pt-BR" sz="6000" b="1" dirty="0">
-                <a:solidFill>
-                  <a:srgbClr val="295872"/>
-                </a:solidFill>
-                <a:effectLst/>
-                <a:latin typeface="Arial" panose="020B0604020202020204" pitchFamily="34" charset="0"/>
-                <a:ea typeface="Calibri" panose="020F0502020204030204" pitchFamily="34" charset="0"/>
-                <a:cs typeface="Times New Roman" panose="02020603050405020304" pitchFamily="18" charset="0"/>
-              </a:rPr>
-              <a:t>) E BIG DATA: USANDO TECNOLOGIAS DA INFORMAÇÃO E COMUNICAÇÃO PARA OBTENÇÃO DE VANTAGEM COMPETITIVA</a:t>
+              <a:t>BACIAS HIDROGRÁFICAS INTELIGENTES: UMA PROPOSTA, A PARTIR DO ESTUDO DOS CONCEITOS E APLICAÇÕES SOBRE CIDADES INTELIGENTES, PARA AUXILIAR A GESTÃO DOS RECURSOS</a:t>
             </a:r>
             <a:endParaRPr lang="pt-BR" sz="6000" dirty="0">
               <a:solidFill>
@@ -7059,8 +7345,8 @@
           </p:cNvPicPr>
           <p:nvPr/>
         </p:nvPicPr>
-        <p:blipFill>
-          <a:blip r:embed="rId4">
+        <p:blipFill rotWithShape="1">
+          <a:blip r:embed="rId3">
             <a:alphaModFix amt="85000"/>
             <a:extLst>
               <a:ext uri="{28A0092B-C50C-407E-A947-70E740481C1C}">
@@ -7068,13 +7354,13 @@
               </a:ext>
             </a:extLst>
           </a:blip>
-          <a:srcRect t="30249" b="30249"/>
+          <a:srcRect t="36532" b="33316"/>
           <a:stretch/>
         </p:blipFill>
         <p:spPr bwMode="auto">
           <a:xfrm>
-            <a:off x="0" y="0"/>
-            <a:ext cx="32400000" cy="7199320"/>
+            <a:off x="0" y="18462"/>
+            <a:ext cx="32400000" cy="5495362"/>
           </a:xfrm>
           <a:prstGeom prst="rect">
             <a:avLst/>
@@ -7105,7 +7391,7 @@
         </p:nvSpPr>
         <p:spPr>
           <a:xfrm>
-            <a:off x="3619022" y="985032"/>
+            <a:off x="3619022" y="73025"/>
             <a:ext cx="22967512" cy="3785652"/>
           </a:xfrm>
           <a:prstGeom prst="rect">
@@ -7198,7 +7484,7 @@
           <p:nvPr/>
         </p:nvPicPr>
         <p:blipFill>
-          <a:blip r:embed="rId5">
+          <a:blip r:embed="rId4">
             <a:extLst>
               <a:ext uri="{28A0092B-C50C-407E-A947-70E740481C1C}">
                 <a14:useLocalDpi xmlns:a14="http://schemas.microsoft.com/office/drawing/2010/main" val="0"/>
@@ -7212,7 +7498,7 @@
         </p:blipFill>
         <p:spPr bwMode="auto">
           <a:xfrm>
-            <a:off x="3619022" y="4882215"/>
+            <a:off x="3619022" y="3766823"/>
             <a:ext cx="9326965" cy="1747001"/>
           </a:xfrm>
           <a:prstGeom prst="rect">
@@ -7244,7 +7530,7 @@
         </p:nvSpPr>
         <p:spPr>
           <a:xfrm>
-            <a:off x="20424260" y="3724243"/>
+            <a:off x="20384317" y="2337306"/>
             <a:ext cx="5924550" cy="2092881"/>
           </a:xfrm>
           <a:prstGeom prst="rect">
@@ -7285,7 +7571,7 @@
         </p:nvSpPr>
         <p:spPr>
           <a:xfrm>
-            <a:off x="20661984" y="5385859"/>
+            <a:off x="20661984" y="3985592"/>
             <a:ext cx="5924550" cy="1200329"/>
           </a:xfrm>
           <a:prstGeom prst="rect">

</xml_diff>